<commit_message>
Initial commit for deployment
</commit_message>
<xml_diff>
--- a/docs/MCA_Mini_Project.pptx
+++ b/docs/MCA_Mini_Project.pptx
@@ -6,37 +6,37 @@
   </p:sldMasterIdLst>
   <p:sldIdLst>
     <p:sldId id="256" r:id="rId2"/>
-    <p:sldId id="257" r:id="rId3"/>
-    <p:sldId id="258" r:id="rId4"/>
-    <p:sldId id="259" r:id="rId5"/>
-    <p:sldId id="260" r:id="rId6"/>
-    <p:sldId id="261" r:id="rId7"/>
-    <p:sldId id="262" r:id="rId8"/>
-    <p:sldId id="263" r:id="rId9"/>
-    <p:sldId id="264" r:id="rId10"/>
-    <p:sldId id="265" r:id="rId11"/>
-    <p:sldId id="298" r:id="rId12"/>
-    <p:sldId id="299" r:id="rId13"/>
-    <p:sldId id="266" r:id="rId14"/>
-    <p:sldId id="267" r:id="rId15"/>
-    <p:sldId id="268" r:id="rId16"/>
-    <p:sldId id="269" r:id="rId17"/>
-    <p:sldId id="270" r:id="rId18"/>
-    <p:sldId id="271" r:id="rId19"/>
-    <p:sldId id="272" r:id="rId20"/>
-    <p:sldId id="273" r:id="rId21"/>
-    <p:sldId id="274" r:id="rId22"/>
-    <p:sldId id="275" r:id="rId23"/>
-    <p:sldId id="276" r:id="rId24"/>
-    <p:sldId id="277" r:id="rId25"/>
-    <p:sldId id="278" r:id="rId26"/>
-    <p:sldId id="279" r:id="rId27"/>
-    <p:sldId id="280" r:id="rId28"/>
-    <p:sldId id="281" r:id="rId29"/>
-    <p:sldId id="282" r:id="rId30"/>
-    <p:sldId id="283" r:id="rId31"/>
-    <p:sldId id="284" r:id="rId32"/>
-    <p:sldId id="285" r:id="rId33"/>
+    <p:sldId id="258" r:id="rId3"/>
+    <p:sldId id="259" r:id="rId4"/>
+    <p:sldId id="260" r:id="rId5"/>
+    <p:sldId id="261" r:id="rId6"/>
+    <p:sldId id="262" r:id="rId7"/>
+    <p:sldId id="263" r:id="rId8"/>
+    <p:sldId id="264" r:id="rId9"/>
+    <p:sldId id="265" r:id="rId10"/>
+    <p:sldId id="302" r:id="rId11"/>
+    <p:sldId id="303" r:id="rId12"/>
+    <p:sldId id="266" r:id="rId13"/>
+    <p:sldId id="267" r:id="rId14"/>
+    <p:sldId id="268" r:id="rId15"/>
+    <p:sldId id="269" r:id="rId16"/>
+    <p:sldId id="270" r:id="rId17"/>
+    <p:sldId id="271" r:id="rId18"/>
+    <p:sldId id="272" r:id="rId19"/>
+    <p:sldId id="273" r:id="rId20"/>
+    <p:sldId id="274" r:id="rId21"/>
+    <p:sldId id="275" r:id="rId22"/>
+    <p:sldId id="276" r:id="rId23"/>
+    <p:sldId id="277" r:id="rId24"/>
+    <p:sldId id="278" r:id="rId25"/>
+    <p:sldId id="279" r:id="rId26"/>
+    <p:sldId id="280" r:id="rId27"/>
+    <p:sldId id="281" r:id="rId28"/>
+    <p:sldId id="282" r:id="rId29"/>
+    <p:sldId id="283" r:id="rId30"/>
+    <p:sldId id="284" r:id="rId31"/>
+    <p:sldId id="285" r:id="rId32"/>
+    <p:sldId id="304" r:id="rId33"/>
     <p:sldId id="286" r:id="rId34"/>
     <p:sldId id="287" r:id="rId35"/>
     <p:sldId id="288" r:id="rId36"/>
@@ -149,7 +149,7 @@
   </p:defaultTextStyle>
   <p:extLst>
     <p:ext uri="{EFAFB233-063F-42B5-8137-9DF3F51BA10A}">
-      <p15:sldGuideLst xmlns:p15="http://schemas.microsoft.com/office/powerpoint/2012/main" xmlns="">
+      <p15:sldGuideLst xmlns="" xmlns:p15="http://schemas.microsoft.com/office/powerpoint/2012/main">
         <p15:guide id="1" orient="horz" pos="2160">
           <p15:clr>
             <a:srgbClr val="A4A3A4"/>
@@ -348,7 +348,7 @@
             <a:fld id="{FB91EC09-53C4-4D8C-B98E-49E4A756575D}" type="datetimeFigureOut">
               <a:rPr lang="en-IN" smtClean="0"/>
               <a:pPr/>
-              <a:t>03-10-2024</a:t>
+              <a:t>16-11-2024</a:t>
             </a:fld>
             <a:endParaRPr lang="en-IN"/>
           </a:p>
@@ -400,7 +400,7 @@
     </p:spTree>
     <p:extLst>
       <p:ext uri="{BB962C8B-B14F-4D97-AF65-F5344CB8AC3E}">
-        <p14:creationId xmlns:p14="http://schemas.microsoft.com/office/powerpoint/2010/main" xmlns="" val="3157072034"/>
+        <p14:creationId xmlns="" xmlns:p14="http://schemas.microsoft.com/office/powerpoint/2010/main" val="3157072034"/>
       </p:ext>
     </p:extLst>
   </p:cSld>
@@ -520,7 +520,7 @@
             <a:fld id="{FB91EC09-53C4-4D8C-B98E-49E4A756575D}" type="datetimeFigureOut">
               <a:rPr lang="en-IN" smtClean="0"/>
               <a:pPr/>
-              <a:t>03-10-2024</a:t>
+              <a:t>16-11-2024</a:t>
             </a:fld>
             <a:endParaRPr lang="en-IN"/>
           </a:p>
@@ -572,7 +572,7 @@
     </p:spTree>
     <p:extLst>
       <p:ext uri="{BB962C8B-B14F-4D97-AF65-F5344CB8AC3E}">
-        <p14:creationId xmlns:p14="http://schemas.microsoft.com/office/powerpoint/2010/main" xmlns="" val="3714197474"/>
+        <p14:creationId xmlns="" xmlns:p14="http://schemas.microsoft.com/office/powerpoint/2010/main" val="3714197474"/>
       </p:ext>
     </p:extLst>
   </p:cSld>
@@ -702,7 +702,7 @@
             <a:fld id="{FB91EC09-53C4-4D8C-B98E-49E4A756575D}" type="datetimeFigureOut">
               <a:rPr lang="en-IN" smtClean="0"/>
               <a:pPr/>
-              <a:t>03-10-2024</a:t>
+              <a:t>16-11-2024</a:t>
             </a:fld>
             <a:endParaRPr lang="en-IN"/>
           </a:p>
@@ -754,7 +754,7 @@
     </p:spTree>
     <p:extLst>
       <p:ext uri="{BB962C8B-B14F-4D97-AF65-F5344CB8AC3E}">
-        <p14:creationId xmlns:p14="http://schemas.microsoft.com/office/powerpoint/2010/main" xmlns="" val="2430005558"/>
+        <p14:creationId xmlns="" xmlns:p14="http://schemas.microsoft.com/office/powerpoint/2010/main" val="2430005558"/>
       </p:ext>
     </p:extLst>
   </p:cSld>
@@ -874,7 +874,7 @@
             <a:fld id="{FB91EC09-53C4-4D8C-B98E-49E4A756575D}" type="datetimeFigureOut">
               <a:rPr lang="en-IN" smtClean="0"/>
               <a:pPr/>
-              <a:t>03-10-2024</a:t>
+              <a:t>16-11-2024</a:t>
             </a:fld>
             <a:endParaRPr lang="en-IN"/>
           </a:p>
@@ -926,7 +926,7 @@
     </p:spTree>
     <p:extLst>
       <p:ext uri="{BB962C8B-B14F-4D97-AF65-F5344CB8AC3E}">
-        <p14:creationId xmlns:p14="http://schemas.microsoft.com/office/powerpoint/2010/main" xmlns="" val="1024235293"/>
+        <p14:creationId xmlns="" xmlns:p14="http://schemas.microsoft.com/office/powerpoint/2010/main" val="1024235293"/>
       </p:ext>
     </p:extLst>
   </p:cSld>
@@ -1122,7 +1122,7 @@
             <a:fld id="{FB91EC09-53C4-4D8C-B98E-49E4A756575D}" type="datetimeFigureOut">
               <a:rPr lang="en-IN" smtClean="0"/>
               <a:pPr/>
-              <a:t>03-10-2024</a:t>
+              <a:t>16-11-2024</a:t>
             </a:fld>
             <a:endParaRPr lang="en-IN"/>
           </a:p>
@@ -1174,7 +1174,7 @@
     </p:spTree>
     <p:extLst>
       <p:ext uri="{BB962C8B-B14F-4D97-AF65-F5344CB8AC3E}">
-        <p14:creationId xmlns:p14="http://schemas.microsoft.com/office/powerpoint/2010/main" xmlns="" val="3843706579"/>
+        <p14:creationId xmlns="" xmlns:p14="http://schemas.microsoft.com/office/powerpoint/2010/main" val="3843706579"/>
       </p:ext>
     </p:extLst>
   </p:cSld>
@@ -1412,7 +1412,7 @@
             <a:fld id="{FB91EC09-53C4-4D8C-B98E-49E4A756575D}" type="datetimeFigureOut">
               <a:rPr lang="en-IN" smtClean="0"/>
               <a:pPr/>
-              <a:t>03-10-2024</a:t>
+              <a:t>16-11-2024</a:t>
             </a:fld>
             <a:endParaRPr lang="en-IN"/>
           </a:p>
@@ -1464,7 +1464,7 @@
     </p:spTree>
     <p:extLst>
       <p:ext uri="{BB962C8B-B14F-4D97-AF65-F5344CB8AC3E}">
-        <p14:creationId xmlns:p14="http://schemas.microsoft.com/office/powerpoint/2010/main" xmlns="" val="2450727290"/>
+        <p14:creationId xmlns="" xmlns:p14="http://schemas.microsoft.com/office/powerpoint/2010/main" val="2450727290"/>
       </p:ext>
     </p:extLst>
   </p:cSld>
@@ -1836,7 +1836,7 @@
             <a:fld id="{FB91EC09-53C4-4D8C-B98E-49E4A756575D}" type="datetimeFigureOut">
               <a:rPr lang="en-IN" smtClean="0"/>
               <a:pPr/>
-              <a:t>03-10-2024</a:t>
+              <a:t>16-11-2024</a:t>
             </a:fld>
             <a:endParaRPr lang="en-IN"/>
           </a:p>
@@ -1888,7 +1888,7 @@
     </p:spTree>
     <p:extLst>
       <p:ext uri="{BB962C8B-B14F-4D97-AF65-F5344CB8AC3E}">
-        <p14:creationId xmlns:p14="http://schemas.microsoft.com/office/powerpoint/2010/main" xmlns="" val="1026776241"/>
+        <p14:creationId xmlns="" xmlns:p14="http://schemas.microsoft.com/office/powerpoint/2010/main" val="1026776241"/>
       </p:ext>
     </p:extLst>
   </p:cSld>
@@ -1956,7 +1956,7 @@
             <a:fld id="{FB91EC09-53C4-4D8C-B98E-49E4A756575D}" type="datetimeFigureOut">
               <a:rPr lang="en-IN" smtClean="0"/>
               <a:pPr/>
-              <a:t>03-10-2024</a:t>
+              <a:t>16-11-2024</a:t>
             </a:fld>
             <a:endParaRPr lang="en-IN"/>
           </a:p>
@@ -2008,7 +2008,7 @@
     </p:spTree>
     <p:extLst>
       <p:ext uri="{BB962C8B-B14F-4D97-AF65-F5344CB8AC3E}">
-        <p14:creationId xmlns:p14="http://schemas.microsoft.com/office/powerpoint/2010/main" xmlns="" val="1633106024"/>
+        <p14:creationId xmlns="" xmlns:p14="http://schemas.microsoft.com/office/powerpoint/2010/main" val="1633106024"/>
       </p:ext>
     </p:extLst>
   </p:cSld>
@@ -2053,7 +2053,7 @@
             <a:fld id="{FB91EC09-53C4-4D8C-B98E-49E4A756575D}" type="datetimeFigureOut">
               <a:rPr lang="en-IN" smtClean="0"/>
               <a:pPr/>
-              <a:t>03-10-2024</a:t>
+              <a:t>16-11-2024</a:t>
             </a:fld>
             <a:endParaRPr lang="en-IN"/>
           </a:p>
@@ -2105,7 +2105,7 @@
     </p:spTree>
     <p:extLst>
       <p:ext uri="{BB962C8B-B14F-4D97-AF65-F5344CB8AC3E}">
-        <p14:creationId xmlns:p14="http://schemas.microsoft.com/office/powerpoint/2010/main" xmlns="" val="789168093"/>
+        <p14:creationId xmlns="" xmlns:p14="http://schemas.microsoft.com/office/powerpoint/2010/main" val="789168093"/>
       </p:ext>
     </p:extLst>
   </p:cSld>
@@ -2332,7 +2332,7 @@
             <a:fld id="{FB91EC09-53C4-4D8C-B98E-49E4A756575D}" type="datetimeFigureOut">
               <a:rPr lang="en-IN" smtClean="0"/>
               <a:pPr/>
-              <a:t>03-10-2024</a:t>
+              <a:t>16-11-2024</a:t>
             </a:fld>
             <a:endParaRPr lang="en-IN"/>
           </a:p>
@@ -2384,7 +2384,7 @@
     </p:spTree>
     <p:extLst>
       <p:ext uri="{BB962C8B-B14F-4D97-AF65-F5344CB8AC3E}">
-        <p14:creationId xmlns:p14="http://schemas.microsoft.com/office/powerpoint/2010/main" xmlns="" val="2419152459"/>
+        <p14:creationId xmlns="" xmlns:p14="http://schemas.microsoft.com/office/powerpoint/2010/main" val="2419152459"/>
       </p:ext>
     </p:extLst>
   </p:cSld>
@@ -2587,7 +2587,7 @@
             <a:fld id="{FB91EC09-53C4-4D8C-B98E-49E4A756575D}" type="datetimeFigureOut">
               <a:rPr lang="en-IN" smtClean="0"/>
               <a:pPr/>
-              <a:t>03-10-2024</a:t>
+              <a:t>16-11-2024</a:t>
             </a:fld>
             <a:endParaRPr lang="en-IN"/>
           </a:p>
@@ -2639,7 +2639,7 @@
     </p:spTree>
     <p:extLst>
       <p:ext uri="{BB962C8B-B14F-4D97-AF65-F5344CB8AC3E}">
-        <p14:creationId xmlns:p14="http://schemas.microsoft.com/office/powerpoint/2010/main" xmlns="" val="2252313617"/>
+        <p14:creationId xmlns="" xmlns:p14="http://schemas.microsoft.com/office/powerpoint/2010/main" val="2252313617"/>
       </p:ext>
     </p:extLst>
   </p:cSld>
@@ -2828,7 +2828,7 @@
             <a:fld id="{FB91EC09-53C4-4D8C-B98E-49E4A756575D}" type="datetimeFigureOut">
               <a:rPr lang="en-IN" smtClean="0"/>
               <a:pPr/>
-              <a:t>03-10-2024</a:t>
+              <a:t>16-11-2024</a:t>
             </a:fld>
             <a:endParaRPr lang="en-IN"/>
           </a:p>
@@ -2916,7 +2916,7 @@
     </p:spTree>
     <p:extLst>
       <p:ext uri="{BB962C8B-B14F-4D97-AF65-F5344CB8AC3E}">
-        <p14:creationId xmlns:p14="http://schemas.microsoft.com/office/powerpoint/2010/main" xmlns="" val="2816753720"/>
+        <p14:creationId xmlns="" xmlns:p14="http://schemas.microsoft.com/office/powerpoint/2010/main" val="2816753720"/>
       </p:ext>
     </p:extLst>
   </p:cSld>
@@ -3241,12 +3241,91 @@
             <p:ph type="subTitle" idx="1"/>
           </p:nvPr>
         </p:nvSpPr>
-        <p:spPr/>
-        <p:txBody>
-          <a:bodyPr/>
-          <a:lstStyle/>
-          <a:p>
-            <a:endParaRPr lang="en-IN"/>
+        <p:spPr>
+          <a:xfrm>
+            <a:off x="228600" y="4876800"/>
+            <a:ext cx="4035777" cy="1676400"/>
+          </a:xfrm>
+        </p:spPr>
+        <p:txBody>
+          <a:bodyPr>
+            <a:normAutofit fontScale="77500" lnSpcReduction="20000"/>
+          </a:bodyPr>
+          <a:lstStyle/>
+          <a:p>
+            <a:pPr algn="l"/>
+            <a:r>
+              <a:rPr lang="en-IN" b="1" u="sng" dirty="0" smtClean="0">
+                <a:solidFill>
+                  <a:schemeClr val="tx1"/>
+                </a:solidFill>
+                <a:latin typeface="Times New Roman" pitchFamily="18" charset="0"/>
+                <a:cs typeface="Times New Roman" pitchFamily="18" charset="0"/>
+              </a:rPr>
+              <a:t>Presented By:</a:t>
+            </a:r>
+            <a:r>
+              <a:rPr lang="en-IN" dirty="0" smtClean="0">
+                <a:solidFill>
+                  <a:schemeClr val="tx1"/>
+                </a:solidFill>
+                <a:latin typeface="Times New Roman" pitchFamily="18" charset="0"/>
+                <a:cs typeface="Times New Roman" pitchFamily="18" charset="0"/>
+              </a:rPr>
+              <a:t/>
+            </a:r>
+            <a:br>
+              <a:rPr lang="en-IN" dirty="0" smtClean="0">
+                <a:solidFill>
+                  <a:schemeClr val="tx1"/>
+                </a:solidFill>
+                <a:latin typeface="Times New Roman" pitchFamily="18" charset="0"/>
+                <a:cs typeface="Times New Roman" pitchFamily="18" charset="0"/>
+              </a:rPr>
+            </a:br>
+            <a:r>
+              <a:rPr lang="en-IN" dirty="0" smtClean="0">
+                <a:solidFill>
+                  <a:schemeClr val="tx1"/>
+                </a:solidFill>
+                <a:latin typeface="Times New Roman" pitchFamily="18" charset="0"/>
+                <a:cs typeface="Times New Roman" pitchFamily="18" charset="0"/>
+              </a:rPr>
+              <a:t>Tirth Patel (23MCA147)</a:t>
+            </a:r>
+          </a:p>
+          <a:p>
+            <a:pPr algn="l"/>
+            <a:r>
+              <a:rPr lang="en-IN" dirty="0" smtClean="0">
+                <a:solidFill>
+                  <a:schemeClr val="tx1"/>
+                </a:solidFill>
+                <a:latin typeface="Times New Roman" pitchFamily="18" charset="0"/>
+                <a:cs typeface="Times New Roman" pitchFamily="18" charset="0"/>
+              </a:rPr>
+              <a:t>Harsh Prajapati (23MCA161)</a:t>
+            </a:r>
+          </a:p>
+          <a:p>
+            <a:pPr algn="l"/>
+            <a:r>
+              <a:rPr lang="en-IN" dirty="0" smtClean="0">
+                <a:solidFill>
+                  <a:schemeClr val="tx1"/>
+                </a:solidFill>
+                <a:latin typeface="Times New Roman" pitchFamily="18" charset="0"/>
+                <a:cs typeface="Times New Roman" pitchFamily="18" charset="0"/>
+              </a:rPr>
+              <a:t>Tejas Prajapati (23MCA164)</a:t>
+            </a:r>
+            <a:endParaRPr lang="en-IN" dirty="0">
+              <a:solidFill>
+                <a:schemeClr val="tx1"/>
+              </a:solidFill>
+              <a:latin typeface="Times New Roman" pitchFamily="18" charset="0"/>
+              <a:cs typeface="Times New Roman" pitchFamily="18" charset="0"/>
+            </a:endParaRPr>
           </a:p>
         </p:txBody>
       </p:sp>
@@ -3255,7 +3334,7 @@
           <p:cNvPr id="4" name="Picture 5">
             <a:extLst>
               <a:ext uri="{FF2B5EF4-FFF2-40B4-BE49-F238E27FC236}">
-                <a16:creationId xmlns:a16="http://schemas.microsoft.com/office/drawing/2014/main" xmlns="" id="{019EDE13-0DAA-7018-42D0-3D4C2F64FBA1}"/>
+                <a16:creationId xmlns="" xmlns:a16="http://schemas.microsoft.com/office/drawing/2014/main" id="{019EDE13-0DAA-7018-42D0-3D4C2F64FBA1}"/>
               </a:ext>
             </a:extLst>
           </p:cNvPr>
@@ -3268,7 +3347,7 @@
           <a:blip r:embed="rId2">
             <a:extLst>
               <a:ext uri="{28A0092B-C50C-407E-A947-70E740481C1C}">
-                <a14:useLocalDpi xmlns:a14="http://schemas.microsoft.com/office/drawing/2010/main" xmlns="" val="0"/>
+                <a14:useLocalDpi xmlns="" xmlns:a14="http://schemas.microsoft.com/office/drawing/2010/main" val="0"/>
               </a:ext>
             </a:extLst>
           </a:blip>
@@ -3288,7 +3367,7 @@
           <a:noFill/>
           <a:extLst>
             <a:ext uri="{909E8E84-426E-40DD-AFC4-6F175D3DCCD1}">
-              <a14:hiddenFill xmlns:a14="http://schemas.microsoft.com/office/drawing/2010/main" xmlns="">
+              <a14:hiddenFill xmlns="" xmlns:a14="http://schemas.microsoft.com/office/drawing/2010/main">
                 <a:solidFill>
                   <a:srgbClr val="FFFFFF"/>
                 </a:solidFill>
@@ -3302,7 +3381,7 @@
           <p:cNvPr id="5" name="image1.png">
             <a:extLst>
               <a:ext uri="{FF2B5EF4-FFF2-40B4-BE49-F238E27FC236}">
-                <a16:creationId xmlns:a16="http://schemas.microsoft.com/office/drawing/2014/main" xmlns="" id="{ABE1990A-3CB7-CA01-CEC4-E021898C55F1}"/>
+                <a16:creationId xmlns="" xmlns:a16="http://schemas.microsoft.com/office/drawing/2014/main" id="{ABE1990A-3CB7-CA01-CEC4-E021898C55F1}"/>
               </a:ext>
             </a:extLst>
           </p:cNvPr>
@@ -3315,7 +3394,7 @@
           <a:blip r:embed="rId3">
             <a:extLst>
               <a:ext uri="{28A0092B-C50C-407E-A947-70E740481C1C}">
-                <a14:useLocalDpi xmlns:a14="http://schemas.microsoft.com/office/drawing/2010/main" xmlns="" val="0"/>
+                <a14:useLocalDpi xmlns="" xmlns:a14="http://schemas.microsoft.com/office/drawing/2010/main" val="0"/>
               </a:ext>
             </a:extLst>
           </a:blip>
@@ -3335,7 +3414,7 @@
           <a:noFill/>
           <a:extLst>
             <a:ext uri="{909E8E84-426E-40DD-AFC4-6F175D3DCCD1}">
-              <a14:hiddenFill xmlns:a14="http://schemas.microsoft.com/office/drawing/2010/main" xmlns="">
+              <a14:hiddenFill xmlns="" xmlns:a14="http://schemas.microsoft.com/office/drawing/2010/main">
                 <a:solidFill>
                   <a:srgbClr val="FFFFFF"/>
                 </a:solidFill>
@@ -3347,7 +3426,7 @@
     </p:spTree>
     <p:extLst>
       <p:ext uri="{BB962C8B-B14F-4D97-AF65-F5344CB8AC3E}">
-        <p14:creationId xmlns:p14="http://schemas.microsoft.com/office/powerpoint/2010/main" xmlns="" val="502753444"/>
+        <p14:creationId xmlns="" xmlns:p14="http://schemas.microsoft.com/office/powerpoint/2010/main" val="502753444"/>
       </p:ext>
     </p:extLst>
   </p:cSld>
@@ -3381,66 +3460,73 @@
             <a:spLocks noGrp="1"/>
           </p:cNvSpPr>
           <p:nvPr>
-            <p:ph type="title"/>
-          </p:nvPr>
-        </p:nvSpPr>
-        <p:spPr/>
-        <p:txBody>
-          <a:bodyPr/>
-          <a:lstStyle/>
-          <a:p>
-            <a:r>
-              <a:rPr lang="en-IN" dirty="0"/>
-              <a:t>Activity Diagram</a:t>
-            </a:r>
-          </a:p>
-        </p:txBody>
-      </p:sp>
-      <p:pic>
-        <p:nvPicPr>
-          <p:cNvPr id="5" name="Content Placeholder 4">
-            <a:extLst>
-              <a:ext uri="{FF2B5EF4-FFF2-40B4-BE49-F238E27FC236}">
-                <a16:creationId xmlns:a16="http://schemas.microsoft.com/office/drawing/2014/main" xmlns="" id="{DB7E9159-DB43-A36E-846D-5C915D84D574}"/>
-              </a:ext>
-            </a:extLst>
-          </p:cNvPr>
-          <p:cNvPicPr>
-            <a:picLocks noGrp="1" noChangeAspect="1"/>
-          </p:cNvPicPr>
-          <p:nvPr>
-            <p:ph idx="1"/>
-          </p:nvPr>
-        </p:nvPicPr>
-        <p:blipFill>
-          <a:blip r:embed="rId2">
-            <a:extLst>
-              <a:ext uri="{28A0092B-C50C-407E-A947-70E740481C1C}">
-                <a14:useLocalDpi xmlns:a14="http://schemas.microsoft.com/office/drawing/2010/main" xmlns="" val="0"/>
-              </a:ext>
-            </a:extLst>
-          </a:blip>
-          <a:stretch>
-            <a:fillRect/>
-          </a:stretch>
-        </p:blipFill>
+            <p:ph type="ctrTitle"/>
+          </p:nvPr>
+        </p:nvSpPr>
         <p:spPr>
           <a:xfrm>
-            <a:off x="457200" y="2361922"/>
-            <a:ext cx="8229600" cy="3810278"/>
+            <a:off x="685800" y="1600200"/>
+            <a:ext cx="7772400" cy="1470025"/>
           </a:xfrm>
         </p:spPr>
-      </p:pic>
+        <p:txBody>
+          <a:bodyPr/>
+          <a:lstStyle/>
+          <a:p>
+            <a:r>
+              <a:rPr lang="en-IN" b="1" u="sng" dirty="0"/>
+              <a:t>Activity </a:t>
+            </a:r>
+            <a:r>
+              <a:rPr lang="en-IN" b="1" u="sng" dirty="0" smtClean="0"/>
+              <a:t>Diagram Recruiter</a:t>
+            </a:r>
+            <a:endParaRPr lang="en-IN" b="1" u="sng" dirty="0"/>
+          </a:p>
+        </p:txBody>
+      </p:sp>
+      <p:sp>
+        <p:nvSpPr>
+          <p:cNvPr id="6" name="Subtitle 5"/>
+          <p:cNvSpPr>
+            <a:spLocks noGrp="1"/>
+          </p:cNvSpPr>
+          <p:nvPr>
+            <p:ph type="subTitle" idx="1"/>
+          </p:nvPr>
+        </p:nvSpPr>
+        <p:spPr/>
+        <p:txBody>
+          <a:bodyPr/>
+          <a:lstStyle/>
+          <a:p>
+            <a:r>
+              <a:rPr lang="en-US" dirty="0" smtClean="0">
+                <a:hlinkClick r:id="rId2" action="ppaction://hlinkfile"/>
+              </a:rPr>
+              <a:t>View Diagram</a:t>
+            </a:r>
+            <a:endParaRPr lang="en-US" dirty="0"/>
+          </a:p>
+        </p:txBody>
+      </p:sp>
     </p:spTree>
     <p:extLst>
       <p:ext uri="{BB962C8B-B14F-4D97-AF65-F5344CB8AC3E}">
-        <p14:creationId xmlns:p14="http://schemas.microsoft.com/office/powerpoint/2010/main" xmlns="" val="326000094"/>
+        <p14:creationId xmlns="" xmlns:p14="http://schemas.microsoft.com/office/powerpoint/2010/main" val="326000094"/>
       </p:ext>
     </p:extLst>
   </p:cSld>
   <p:clrMapOvr>
     <a:masterClrMapping/>
   </p:clrMapOvr>
+  <p:timing>
+    <p:tnLst>
+      <p:par>
+        <p:cTn id="1" dur="indefinite" restart="never" nodeType="tmRoot"/>
+      </p:par>
+    </p:tnLst>
+  </p:timing>
 </p:sld>
 </file>
 
@@ -3463,74 +3549,78 @@
       </p:grpSpPr>
       <p:sp>
         <p:nvSpPr>
-          <p:cNvPr id="2" name="Title 1">
-            <a:extLst>
-              <a:ext uri="{FF2B5EF4-FFF2-40B4-BE49-F238E27FC236}">
-                <a16:creationId xmlns:a16="http://schemas.microsoft.com/office/drawing/2014/main" xmlns="" id="{DC235E14-6755-484A-E787-9B237F19E7CD}"/>
-              </a:ext>
-            </a:extLst>
-          </p:cNvPr>
-          <p:cNvSpPr>
-            <a:spLocks noGrp="1"/>
-          </p:cNvSpPr>
-          <p:nvPr>
-            <p:ph type="title"/>
-          </p:nvPr>
-        </p:nvSpPr>
-        <p:spPr/>
-        <p:txBody>
-          <a:bodyPr/>
-          <a:lstStyle/>
-          <a:p>
-            <a:endParaRPr lang="en-IN"/>
-          </a:p>
-        </p:txBody>
-      </p:sp>
-      <p:pic>
-        <p:nvPicPr>
-          <p:cNvPr id="5" name="Content Placeholder 4">
-            <a:extLst>
-              <a:ext uri="{FF2B5EF4-FFF2-40B4-BE49-F238E27FC236}">
-                <a16:creationId xmlns:a16="http://schemas.microsoft.com/office/drawing/2014/main" xmlns="" id="{6FC76298-BDCF-2D64-0B45-356084488887}"/>
-              </a:ext>
-            </a:extLst>
-          </p:cNvPr>
-          <p:cNvPicPr>
-            <a:picLocks noGrp="1" noChangeAspect="1"/>
-          </p:cNvPicPr>
-          <p:nvPr>
-            <p:ph idx="1"/>
-          </p:nvPr>
-        </p:nvPicPr>
-        <p:blipFill>
-          <a:blip r:embed="rId2">
-            <a:extLst>
-              <a:ext uri="{28A0092B-C50C-407E-A947-70E740481C1C}">
-                <a14:useLocalDpi xmlns:a14="http://schemas.microsoft.com/office/drawing/2010/main" xmlns="" val="0"/>
-              </a:ext>
-            </a:extLst>
-          </a:blip>
-          <a:stretch>
-            <a:fillRect/>
-          </a:stretch>
-        </p:blipFill>
+          <p:cNvPr id="2" name="Title 1"/>
+          <p:cNvSpPr>
+            <a:spLocks noGrp="1"/>
+          </p:cNvSpPr>
+          <p:nvPr>
+            <p:ph type="ctrTitle"/>
+          </p:nvPr>
+        </p:nvSpPr>
         <p:spPr>
           <a:xfrm>
-            <a:off x="457200" y="2361922"/>
-            <a:ext cx="7937310" cy="3353078"/>
+            <a:off x="685800" y="1600200"/>
+            <a:ext cx="7772400" cy="1470025"/>
           </a:xfrm>
         </p:spPr>
-      </p:pic>
+        <p:txBody>
+          <a:bodyPr/>
+          <a:lstStyle/>
+          <a:p>
+            <a:r>
+              <a:rPr lang="en-IN" b="1" u="sng" dirty="0"/>
+              <a:t>Activity </a:t>
+            </a:r>
+            <a:r>
+              <a:rPr lang="en-IN" b="1" u="sng" dirty="0" smtClean="0"/>
+              <a:t>Diagram Student</a:t>
+            </a:r>
+            <a:endParaRPr lang="en-IN" b="1" u="sng" dirty="0"/>
+          </a:p>
+        </p:txBody>
+      </p:sp>
+      <p:sp>
+        <p:nvSpPr>
+          <p:cNvPr id="6" name="Subtitle 5"/>
+          <p:cNvSpPr>
+            <a:spLocks noGrp="1"/>
+          </p:cNvSpPr>
+          <p:nvPr>
+            <p:ph type="subTitle" idx="1"/>
+          </p:nvPr>
+        </p:nvSpPr>
+        <p:spPr/>
+        <p:txBody>
+          <a:bodyPr/>
+          <a:lstStyle/>
+          <a:p>
+            <a:r>
+              <a:rPr lang="en-US" dirty="0" smtClean="0">
+                <a:hlinkClick r:id="rId2" action="ppaction://hlinkfile"/>
+              </a:rPr>
+              <a:t>View Diagram</a:t>
+            </a:r>
+            <a:endParaRPr lang="en-US" dirty="0"/>
+          </a:p>
+        </p:txBody>
+      </p:sp>
     </p:spTree>
     <p:extLst>
       <p:ext uri="{BB962C8B-B14F-4D97-AF65-F5344CB8AC3E}">
-        <p14:creationId xmlns:p14="http://schemas.microsoft.com/office/powerpoint/2010/main" xmlns="" val="4120438240"/>
+        <p14:creationId xmlns="" xmlns:p14="http://schemas.microsoft.com/office/powerpoint/2010/main" val="326000094"/>
       </p:ext>
     </p:extLst>
   </p:cSld>
   <p:clrMapOvr>
     <a:masterClrMapping/>
   </p:clrMapOvr>
+  <p:timing>
+    <p:tnLst>
+      <p:par>
+        <p:cTn id="1" dur="indefinite" restart="never" nodeType="tmRoot"/>
+      </p:par>
+    </p:tnLst>
+  </p:timing>
 </p:sld>
 </file>
 
@@ -3553,13 +3643,7 @@
       </p:grpSpPr>
       <p:sp>
         <p:nvSpPr>
-          <p:cNvPr id="2" name="Title 1">
-            <a:extLst>
-              <a:ext uri="{FF2B5EF4-FFF2-40B4-BE49-F238E27FC236}">
-                <a16:creationId xmlns:a16="http://schemas.microsoft.com/office/drawing/2014/main" xmlns="" id="{A13F1AEC-268D-7A59-11B5-82C8926BAD35}"/>
-              </a:ext>
-            </a:extLst>
-          </p:cNvPr>
+          <p:cNvPr id="2" name="Title 1"/>
           <p:cNvSpPr>
             <a:spLocks noGrp="1"/>
           </p:cNvSpPr>
@@ -3567,122 +3651,45 @@
             <p:ph type="title"/>
           </p:nvPr>
         </p:nvSpPr>
-        <p:spPr/>
-        <p:txBody>
-          <a:bodyPr/>
-          <a:lstStyle/>
-          <a:p>
-            <a:endParaRPr lang="en-IN"/>
-          </a:p>
-        </p:txBody>
-      </p:sp>
-      <p:pic>
-        <p:nvPicPr>
-          <p:cNvPr id="5" name="Content Placeholder 4">
-            <a:extLst>
-              <a:ext uri="{FF2B5EF4-FFF2-40B4-BE49-F238E27FC236}">
-                <a16:creationId xmlns:a16="http://schemas.microsoft.com/office/drawing/2014/main" xmlns="" id="{738B01EB-7EFE-E84D-6BA1-B031AD42E0FF}"/>
-              </a:ext>
-            </a:extLst>
-          </p:cNvPr>
-          <p:cNvPicPr>
-            <a:picLocks noGrp="1" noChangeAspect="1"/>
-          </p:cNvPicPr>
-          <p:nvPr>
-            <p:ph idx="1"/>
-          </p:nvPr>
-        </p:nvPicPr>
-        <p:blipFill>
-          <a:blip r:embed="rId2">
-            <a:extLst>
-              <a:ext uri="{28A0092B-C50C-407E-A947-70E740481C1C}">
-                <a14:useLocalDpi xmlns:a14="http://schemas.microsoft.com/office/drawing/2010/main" xmlns="" val="0"/>
-              </a:ext>
-            </a:extLst>
-          </a:blip>
-          <a:stretch>
-            <a:fillRect/>
-          </a:stretch>
-        </p:blipFill>
         <p:spPr>
           <a:xfrm>
-            <a:off x="457200" y="1728629"/>
-            <a:ext cx="8229600" cy="4269105"/>
+            <a:off x="457200" y="274638"/>
+            <a:ext cx="8229600" cy="6126162"/>
           </a:xfrm>
         </p:spPr>
-      </p:pic>
+        <p:txBody>
+          <a:bodyPr/>
+          <a:lstStyle/>
+          <a:p>
+            <a:r>
+              <a:rPr lang="en-US" sz="5000" b="1" dirty="0"/>
+              <a:t>SCREEN LAYOUT</a:t>
+            </a:r>
+            <a:endParaRPr lang="en-IN" sz="5000" b="1" dirty="0"/>
+          </a:p>
+        </p:txBody>
+      </p:sp>
     </p:spTree>
     <p:extLst>
       <p:ext uri="{BB962C8B-B14F-4D97-AF65-F5344CB8AC3E}">
-        <p14:creationId xmlns:p14="http://schemas.microsoft.com/office/powerpoint/2010/main" xmlns="" val="766191638"/>
+        <p14:creationId xmlns="" xmlns:p14="http://schemas.microsoft.com/office/powerpoint/2010/main" val="2775023804"/>
       </p:ext>
     </p:extLst>
   </p:cSld>
   <p:clrMapOvr>
     <a:masterClrMapping/>
   </p:clrMapOvr>
+  <p:timing>
+    <p:tnLst>
+      <p:par>
+        <p:cTn id="1" dur="indefinite" restart="never" nodeType="tmRoot"/>
+      </p:par>
+    </p:tnLst>
+  </p:timing>
 </p:sld>
 </file>
 
 <file path=ppt/slides/slide13.xml><?xml version="1.0" encoding="utf-8"?>
-<p:sld xmlns:a="http://schemas.openxmlformats.org/drawingml/2006/main" xmlns:r="http://schemas.openxmlformats.org/officeDocument/2006/relationships" xmlns:p="http://schemas.openxmlformats.org/presentationml/2006/main">
-  <p:cSld>
-    <p:spTree>
-      <p:nvGrpSpPr>
-        <p:cNvPr id="1" name=""/>
-        <p:cNvGrpSpPr/>
-        <p:nvPr/>
-      </p:nvGrpSpPr>
-      <p:grpSpPr>
-        <a:xfrm>
-          <a:off x="0" y="0"/>
-          <a:ext cx="0" cy="0"/>
-          <a:chOff x="0" y="0"/>
-          <a:chExt cx="0" cy="0"/>
-        </a:xfrm>
-      </p:grpSpPr>
-      <p:sp>
-        <p:nvSpPr>
-          <p:cNvPr id="2" name="Title 1"/>
-          <p:cNvSpPr>
-            <a:spLocks noGrp="1"/>
-          </p:cNvSpPr>
-          <p:nvPr>
-            <p:ph type="title"/>
-          </p:nvPr>
-        </p:nvSpPr>
-        <p:spPr>
-          <a:xfrm>
-            <a:off x="457200" y="274638"/>
-            <a:ext cx="8229600" cy="6126162"/>
-          </a:xfrm>
-        </p:spPr>
-        <p:txBody>
-          <a:bodyPr/>
-          <a:lstStyle/>
-          <a:p>
-            <a:r>
-              <a:rPr lang="en-US" sz="5000" b="1" dirty="0"/>
-              <a:t>SCREEN LAYOUT</a:t>
-            </a:r>
-            <a:endParaRPr lang="en-IN" sz="5000" b="1" dirty="0"/>
-          </a:p>
-        </p:txBody>
-      </p:sp>
-    </p:spTree>
-    <p:extLst>
-      <p:ext uri="{BB962C8B-B14F-4D97-AF65-F5344CB8AC3E}">
-        <p14:creationId xmlns:p14="http://schemas.microsoft.com/office/powerpoint/2010/main" xmlns="" val="2775023804"/>
-      </p:ext>
-    </p:extLst>
-  </p:cSld>
-  <p:clrMapOvr>
-    <a:masterClrMapping/>
-  </p:clrMapOvr>
-</p:sld>
-</file>
-
-<file path=ppt/slides/slide14.xml><?xml version="1.0" encoding="utf-8"?>
 <p:sld xmlns:a="http://schemas.openxmlformats.org/drawingml/2006/main" xmlns:r="http://schemas.openxmlformats.org/officeDocument/2006/relationships" xmlns:p="http://schemas.openxmlformats.org/presentationml/2006/main">
   <p:cSld>
     <p:spTree>
@@ -3761,17 +3768,24 @@
     </p:spTree>
     <p:extLst>
       <p:ext uri="{BB962C8B-B14F-4D97-AF65-F5344CB8AC3E}">
-        <p14:creationId xmlns:p14="http://schemas.microsoft.com/office/powerpoint/2010/main" xmlns="" val="1762045634"/>
+        <p14:creationId xmlns="" xmlns:p14="http://schemas.microsoft.com/office/powerpoint/2010/main" val="1762045634"/>
       </p:ext>
     </p:extLst>
   </p:cSld>
   <p:clrMapOvr>
     <a:masterClrMapping/>
   </p:clrMapOvr>
+  <p:timing>
+    <p:tnLst>
+      <p:par>
+        <p:cTn id="1" dur="indefinite" restart="never" nodeType="tmRoot"/>
+      </p:par>
+    </p:tnLst>
+  </p:timing>
 </p:sld>
 </file>
 
-<file path=ppt/slides/slide15.xml><?xml version="1.0" encoding="utf-8"?>
+<file path=ppt/slides/slide14.xml><?xml version="1.0" encoding="utf-8"?>
 <p:sld xmlns:a="http://schemas.openxmlformats.org/drawingml/2006/main" xmlns:r="http://schemas.openxmlformats.org/officeDocument/2006/relationships" xmlns:p="http://schemas.openxmlformats.org/presentationml/2006/main">
   <p:cSld>
     <p:spTree>
@@ -3848,17 +3862,24 @@
     </p:spTree>
     <p:extLst>
       <p:ext uri="{BB962C8B-B14F-4D97-AF65-F5344CB8AC3E}">
-        <p14:creationId xmlns:p14="http://schemas.microsoft.com/office/powerpoint/2010/main" xmlns="" val="678117027"/>
+        <p14:creationId xmlns="" xmlns:p14="http://schemas.microsoft.com/office/powerpoint/2010/main" val="678117027"/>
       </p:ext>
     </p:extLst>
   </p:cSld>
   <p:clrMapOvr>
     <a:masterClrMapping/>
   </p:clrMapOvr>
+  <p:timing>
+    <p:tnLst>
+      <p:par>
+        <p:cTn id="1" dur="indefinite" restart="never" nodeType="tmRoot"/>
+      </p:par>
+    </p:tnLst>
+  </p:timing>
 </p:sld>
 </file>
 
-<file path=ppt/slides/slide16.xml><?xml version="1.0" encoding="utf-8"?>
+<file path=ppt/slides/slide15.xml><?xml version="1.0" encoding="utf-8"?>
 <p:sld xmlns:a="http://schemas.openxmlformats.org/drawingml/2006/main" xmlns:r="http://schemas.openxmlformats.org/officeDocument/2006/relationships" xmlns:p="http://schemas.openxmlformats.org/presentationml/2006/main">
   <p:cSld>
     <p:spTree>
@@ -3935,7 +3956,7 @@
     </p:spTree>
     <p:extLst>
       <p:ext uri="{BB962C8B-B14F-4D97-AF65-F5344CB8AC3E}">
-        <p14:creationId xmlns:p14="http://schemas.microsoft.com/office/powerpoint/2010/main" xmlns="" val="4172443578"/>
+        <p14:creationId xmlns="" xmlns:p14="http://schemas.microsoft.com/office/powerpoint/2010/main" val="4172443578"/>
       </p:ext>
     </p:extLst>
   </p:cSld>
@@ -3945,7 +3966,7 @@
 </p:sld>
 </file>
 
-<file path=ppt/slides/slide17.xml><?xml version="1.0" encoding="utf-8"?>
+<file path=ppt/slides/slide16.xml><?xml version="1.0" encoding="utf-8"?>
 <p:sld xmlns:a="http://schemas.openxmlformats.org/drawingml/2006/main" xmlns:r="http://schemas.openxmlformats.org/officeDocument/2006/relationships" xmlns:p="http://schemas.openxmlformats.org/presentationml/2006/main">
   <p:cSld>
     <p:spTree>
@@ -4052,7 +4073,7 @@
     </p:spTree>
     <p:extLst>
       <p:ext uri="{BB962C8B-B14F-4D97-AF65-F5344CB8AC3E}">
-        <p14:creationId xmlns:p14="http://schemas.microsoft.com/office/powerpoint/2010/main" xmlns="" val="4279009553"/>
+        <p14:creationId xmlns="" xmlns:p14="http://schemas.microsoft.com/office/powerpoint/2010/main" val="4279009553"/>
       </p:ext>
     </p:extLst>
   </p:cSld>
@@ -4062,7 +4083,7 @@
 </p:sld>
 </file>
 
-<file path=ppt/slides/slide18.xml><?xml version="1.0" encoding="utf-8"?>
+<file path=ppt/slides/slide17.xml><?xml version="1.0" encoding="utf-8"?>
 <p:sld xmlns:a="http://schemas.openxmlformats.org/drawingml/2006/main" xmlns:r="http://schemas.openxmlformats.org/officeDocument/2006/relationships" xmlns:p="http://schemas.openxmlformats.org/presentationml/2006/main">
   <p:cSld>
     <p:spTree>
@@ -4139,7 +4160,7 @@
     </p:spTree>
     <p:extLst>
       <p:ext uri="{BB962C8B-B14F-4D97-AF65-F5344CB8AC3E}">
-        <p14:creationId xmlns:p14="http://schemas.microsoft.com/office/powerpoint/2010/main" xmlns="" val="1788311122"/>
+        <p14:creationId xmlns="" xmlns:p14="http://schemas.microsoft.com/office/powerpoint/2010/main" val="1788311122"/>
       </p:ext>
     </p:extLst>
   </p:cSld>
@@ -4149,7 +4170,7 @@
 </p:sld>
 </file>
 
-<file path=ppt/slides/slide19.xml><?xml version="1.0" encoding="utf-8"?>
+<file path=ppt/slides/slide18.xml><?xml version="1.0" encoding="utf-8"?>
 <p:sld xmlns:a="http://schemas.openxmlformats.org/drawingml/2006/main" xmlns:r="http://schemas.openxmlformats.org/officeDocument/2006/relationships" xmlns:p="http://schemas.openxmlformats.org/presentationml/2006/main">
   <p:cSld>
     <p:spTree>
@@ -4226,7 +4247,7 @@
     </p:spTree>
     <p:extLst>
       <p:ext uri="{BB962C8B-B14F-4D97-AF65-F5344CB8AC3E}">
-        <p14:creationId xmlns:p14="http://schemas.microsoft.com/office/powerpoint/2010/main" xmlns="" val="3722840928"/>
+        <p14:creationId xmlns="" xmlns:p14="http://schemas.microsoft.com/office/powerpoint/2010/main" val="3722840928"/>
       </p:ext>
     </p:extLst>
   </p:cSld>
@@ -4236,394 +4257,7 @@
 </p:sld>
 </file>
 
-<file path=ppt/slides/slide2.xml><?xml version="1.0" encoding="utf-8"?>
-<p:sld xmlns:a="http://schemas.openxmlformats.org/drawingml/2006/main" xmlns:r="http://schemas.openxmlformats.org/officeDocument/2006/relationships" xmlns:p="http://schemas.openxmlformats.org/presentationml/2006/main">
-  <p:cSld>
-    <p:spTree>
-      <p:nvGrpSpPr>
-        <p:cNvPr id="1" name=""/>
-        <p:cNvGrpSpPr/>
-        <p:nvPr/>
-      </p:nvGrpSpPr>
-      <p:grpSpPr>
-        <a:xfrm>
-          <a:off x="0" y="0"/>
-          <a:ext cx="0" cy="0"/>
-          <a:chOff x="0" y="0"/>
-          <a:chExt cx="0" cy="0"/>
-        </a:xfrm>
-      </p:grpSpPr>
-      <p:sp>
-        <p:nvSpPr>
-          <p:cNvPr id="2" name="Title 1"/>
-          <p:cNvSpPr>
-            <a:spLocks noGrp="1"/>
-          </p:cNvSpPr>
-          <p:nvPr>
-            <p:ph type="title"/>
-          </p:nvPr>
-        </p:nvSpPr>
-        <p:spPr/>
-        <p:txBody>
-          <a:bodyPr/>
-          <a:lstStyle/>
-          <a:p>
-            <a:r>
-              <a:rPr lang="en-US" dirty="0">
-                <a:latin typeface="Algerian" panose="04020705040A02060702" pitchFamily="82" charset="0"/>
-              </a:rPr>
-              <a:t>Acknowledgement</a:t>
-            </a:r>
-            <a:endParaRPr lang="en-IN" dirty="0">
-              <a:latin typeface="Algerian" panose="04020705040A02060702" pitchFamily="82" charset="0"/>
-            </a:endParaRPr>
-          </a:p>
-        </p:txBody>
-      </p:sp>
-      <p:sp>
-        <p:nvSpPr>
-          <p:cNvPr id="3" name="Content Placeholder 2"/>
-          <p:cNvSpPr>
-            <a:spLocks noGrp="1"/>
-          </p:cNvSpPr>
-          <p:nvPr>
-            <p:ph idx="1"/>
-          </p:nvPr>
-        </p:nvSpPr>
-        <p:spPr/>
-        <p:txBody>
-          <a:bodyPr>
-            <a:normAutofit fontScale="62500" lnSpcReduction="20000"/>
-          </a:bodyPr>
-          <a:lstStyle/>
-          <a:p>
-            <a:pPr marL="0" marR="0" indent="0" algn="just">
-              <a:spcBef>
-                <a:spcPts val="0"/>
-              </a:spcBef>
-              <a:spcAft>
-                <a:spcPts val="0"/>
-              </a:spcAft>
-            </a:pPr>
-            <a:r>
-              <a:rPr lang="en-US" dirty="0">
-                <a:effectLst/>
-                <a:latin typeface="Times New Roman" panose="02020603050405020304" pitchFamily="18" charset="0"/>
-                <a:ea typeface="Times New Roman" panose="02020603050405020304" pitchFamily="18" charset="0"/>
-                <a:cs typeface="Times New Roman" panose="02020603050405020304" pitchFamily="18" charset="0"/>
-              </a:rPr>
-              <a:t>Knowledge in itself is a continuous process.  At this moment of our substantial enhancement, We rarely find words to express our gratitude towards those who were constantly involved with us.</a:t>
-            </a:r>
-            <a:endParaRPr lang="en-US" dirty="0">
-              <a:effectLst/>
-              <a:latin typeface="Calibri" panose="020F0502020204030204" pitchFamily="34" charset="0"/>
-              <a:ea typeface="Times New Roman" panose="02020603050405020304" pitchFamily="18" charset="0"/>
-              <a:cs typeface="Times New Roman" panose="02020603050405020304" pitchFamily="18" charset="0"/>
-            </a:endParaRPr>
-          </a:p>
-          <a:p>
-            <a:pPr marL="0" marR="0" indent="228600" algn="just">
-              <a:spcBef>
-                <a:spcPts val="0"/>
-              </a:spcBef>
-              <a:spcAft>
-                <a:spcPts val="0"/>
-              </a:spcAft>
-            </a:pPr>
-            <a:r>
-              <a:rPr lang="en-US" dirty="0">
-                <a:effectLst/>
-                <a:latin typeface="Times New Roman" panose="02020603050405020304" pitchFamily="18" charset="0"/>
-                <a:ea typeface="Times New Roman" panose="02020603050405020304" pitchFamily="18" charset="0"/>
-                <a:cs typeface="Times New Roman" panose="02020603050405020304" pitchFamily="18" charset="0"/>
-              </a:rPr>
-              <a:t> </a:t>
-            </a:r>
-            <a:endParaRPr lang="en-US" dirty="0">
-              <a:effectLst/>
-              <a:latin typeface="Calibri" panose="020F0502020204030204" pitchFamily="34" charset="0"/>
-              <a:ea typeface="Times New Roman" panose="02020603050405020304" pitchFamily="18" charset="0"/>
-              <a:cs typeface="Times New Roman" panose="02020603050405020304" pitchFamily="18" charset="0"/>
-            </a:endParaRPr>
-          </a:p>
-          <a:p>
-            <a:pPr marL="0" marR="0" indent="0" algn="just">
-              <a:spcBef>
-                <a:spcPts val="0"/>
-              </a:spcBef>
-              <a:spcAft>
-                <a:spcPts val="0"/>
-              </a:spcAft>
-            </a:pPr>
-            <a:r>
-              <a:rPr lang="en-US" dirty="0">
-                <a:effectLst/>
-                <a:latin typeface="Times New Roman" panose="02020603050405020304" pitchFamily="18" charset="0"/>
-                <a:ea typeface="Times New Roman" panose="02020603050405020304" pitchFamily="18" charset="0"/>
-                <a:cs typeface="Times New Roman" panose="02020603050405020304" pitchFamily="18" charset="0"/>
-              </a:rPr>
-              <a:t>The completion of any inter disciplinary project depends upon coordination, cooperation and combined efforts of several resources of knowledge, creativity, skill, energy and time. The work being accomplished now, we feel our sincerest urge to recall and knowledge through these lines, trying our best to give full credit wherever it deserves.</a:t>
-            </a:r>
-            <a:endParaRPr lang="en-US" dirty="0">
-              <a:effectLst/>
-              <a:latin typeface="Calibri" panose="020F0502020204030204" pitchFamily="34" charset="0"/>
-              <a:ea typeface="Times New Roman" panose="02020603050405020304" pitchFamily="18" charset="0"/>
-              <a:cs typeface="Times New Roman" panose="02020603050405020304" pitchFamily="18" charset="0"/>
-            </a:endParaRPr>
-          </a:p>
-          <a:p>
-            <a:pPr marL="0" marR="0" indent="0" algn="just">
-              <a:spcBef>
-                <a:spcPts val="0"/>
-              </a:spcBef>
-              <a:spcAft>
-                <a:spcPts val="0"/>
-              </a:spcAft>
-            </a:pPr>
-            <a:r>
-              <a:rPr lang="en-US" dirty="0">
-                <a:effectLst/>
-                <a:latin typeface="Times New Roman" panose="02020603050405020304" pitchFamily="18" charset="0"/>
-                <a:ea typeface="Times New Roman" panose="02020603050405020304" pitchFamily="18" charset="0"/>
-                <a:cs typeface="Times New Roman" panose="02020603050405020304" pitchFamily="18" charset="0"/>
-              </a:rPr>
-              <a:t> </a:t>
-            </a:r>
-            <a:endParaRPr lang="en-US" dirty="0">
-              <a:effectLst/>
-              <a:latin typeface="Calibri" panose="020F0502020204030204" pitchFamily="34" charset="0"/>
-              <a:ea typeface="Times New Roman" panose="02020603050405020304" pitchFamily="18" charset="0"/>
-              <a:cs typeface="Times New Roman" panose="02020603050405020304" pitchFamily="18" charset="0"/>
-            </a:endParaRPr>
-          </a:p>
-          <a:p>
-            <a:pPr marL="0" marR="0" indent="0" algn="just">
-              <a:spcBef>
-                <a:spcPts val="0"/>
-              </a:spcBef>
-              <a:spcAft>
-                <a:spcPts val="0"/>
-              </a:spcAft>
-            </a:pPr>
-            <a:r>
-              <a:rPr lang="en-US" dirty="0">
-                <a:effectLst/>
-                <a:latin typeface="Times New Roman" panose="02020603050405020304" pitchFamily="18" charset="0"/>
-                <a:ea typeface="Times New Roman" panose="02020603050405020304" pitchFamily="18" charset="0"/>
-                <a:cs typeface="Times New Roman" panose="02020603050405020304" pitchFamily="18" charset="0"/>
-              </a:rPr>
-              <a:t>We would like to thank our project guide </a:t>
-            </a:r>
-            <a:r>
-              <a:rPr lang="en-US" b="1" dirty="0" err="1">
-                <a:latin typeface="Times New Roman" panose="02020603050405020304" pitchFamily="18" charset="0"/>
-                <a:ea typeface="Times New Roman" panose="02020603050405020304" pitchFamily="18" charset="0"/>
-                <a:cs typeface="Times New Roman" panose="02020603050405020304" pitchFamily="18" charset="0"/>
-              </a:rPr>
-              <a:t>Ms</a:t>
-            </a:r>
-            <a:r>
-              <a:rPr lang="en-US" b="1" dirty="0">
-                <a:latin typeface="Times New Roman" panose="02020603050405020304" pitchFamily="18" charset="0"/>
-                <a:ea typeface="Times New Roman" panose="02020603050405020304" pitchFamily="18" charset="0"/>
-                <a:cs typeface="Times New Roman" panose="02020603050405020304" pitchFamily="18" charset="0"/>
-              </a:rPr>
-              <a:t> </a:t>
-            </a:r>
-            <a:r>
-              <a:rPr lang="en-US" b="1" dirty="0" err="1">
-                <a:latin typeface="Times New Roman" panose="02020603050405020304" pitchFamily="18" charset="0"/>
-                <a:ea typeface="Times New Roman" panose="02020603050405020304" pitchFamily="18" charset="0"/>
-                <a:cs typeface="Times New Roman" panose="02020603050405020304" pitchFamily="18" charset="0"/>
-              </a:rPr>
-              <a:t>Kritika</a:t>
-            </a:r>
-            <a:r>
-              <a:rPr lang="en-US" b="1" dirty="0">
-                <a:latin typeface="Times New Roman" panose="02020603050405020304" pitchFamily="18" charset="0"/>
-                <a:ea typeface="Times New Roman" panose="02020603050405020304" pitchFamily="18" charset="0"/>
-                <a:cs typeface="Times New Roman" panose="02020603050405020304" pitchFamily="18" charset="0"/>
-              </a:rPr>
-              <a:t> </a:t>
-            </a:r>
-            <a:r>
-              <a:rPr lang="en-US" b="1" dirty="0" err="1">
-                <a:latin typeface="Times New Roman" panose="02020603050405020304" pitchFamily="18" charset="0"/>
-                <a:ea typeface="Times New Roman" panose="02020603050405020304" pitchFamily="18" charset="0"/>
-                <a:cs typeface="Times New Roman" panose="02020603050405020304" pitchFamily="18" charset="0"/>
-              </a:rPr>
-              <a:t>Pandey</a:t>
-            </a:r>
-            <a:r>
-              <a:rPr lang="en-US" b="1" dirty="0">
-                <a:effectLst/>
-                <a:latin typeface="Times New Roman" panose="02020603050405020304" pitchFamily="18" charset="0"/>
-                <a:ea typeface="Times New Roman" panose="02020603050405020304" pitchFamily="18" charset="0"/>
-                <a:cs typeface="Times New Roman" panose="02020603050405020304" pitchFamily="18" charset="0"/>
-              </a:rPr>
-              <a:t> ,</a:t>
-            </a:r>
-            <a:r>
-              <a:rPr lang="en-US" dirty="0">
-                <a:effectLst/>
-                <a:latin typeface="Times New Roman" panose="02020603050405020304" pitchFamily="18" charset="0"/>
-                <a:ea typeface="Times New Roman" panose="02020603050405020304" pitchFamily="18" charset="0"/>
-                <a:cs typeface="Times New Roman" panose="02020603050405020304" pitchFamily="18" charset="0"/>
-              </a:rPr>
-              <a:t> I/C Principal </a:t>
-            </a:r>
-            <a:r>
-              <a:rPr lang="en-US" b="1" dirty="0">
-                <a:effectLst/>
-                <a:latin typeface="Times New Roman" panose="02020603050405020304" pitchFamily="18" charset="0"/>
-                <a:ea typeface="Times New Roman" panose="02020603050405020304" pitchFamily="18" charset="0"/>
-                <a:cs typeface="Times New Roman" panose="02020603050405020304" pitchFamily="18" charset="0"/>
-              </a:rPr>
-              <a:t>Dr. </a:t>
-            </a:r>
-            <a:r>
-              <a:rPr lang="en-US" b="1" dirty="0" err="1">
-                <a:effectLst/>
-                <a:latin typeface="Times New Roman" panose="02020603050405020304" pitchFamily="18" charset="0"/>
-                <a:ea typeface="Times New Roman" panose="02020603050405020304" pitchFamily="18" charset="0"/>
-                <a:cs typeface="Times New Roman" panose="02020603050405020304" pitchFamily="18" charset="0"/>
-              </a:rPr>
-              <a:t>Dharmendra</a:t>
-            </a:r>
-            <a:r>
-              <a:rPr lang="en-US" b="1" dirty="0">
-                <a:effectLst/>
-                <a:latin typeface="Times New Roman" panose="02020603050405020304" pitchFamily="18" charset="0"/>
-                <a:ea typeface="Times New Roman" panose="02020603050405020304" pitchFamily="18" charset="0"/>
-                <a:cs typeface="Times New Roman" panose="02020603050405020304" pitchFamily="18" charset="0"/>
-              </a:rPr>
-              <a:t> Patel</a:t>
-            </a:r>
-            <a:r>
-              <a:rPr lang="en-US" dirty="0">
-                <a:effectLst/>
-                <a:latin typeface="Times New Roman" panose="02020603050405020304" pitchFamily="18" charset="0"/>
-                <a:ea typeface="Times New Roman" panose="02020603050405020304" pitchFamily="18" charset="0"/>
-                <a:cs typeface="Times New Roman" panose="02020603050405020304" pitchFamily="18" charset="0"/>
-              </a:rPr>
-              <a:t> and I/C Dean </a:t>
-            </a:r>
-            <a:r>
-              <a:rPr lang="en-US" b="1" dirty="0">
-                <a:effectLst/>
-                <a:latin typeface="Times New Roman" panose="02020603050405020304" pitchFamily="18" charset="0"/>
-                <a:ea typeface="Times New Roman" panose="02020603050405020304" pitchFamily="18" charset="0"/>
-                <a:cs typeface="Times New Roman" panose="02020603050405020304" pitchFamily="18" charset="0"/>
-              </a:rPr>
-              <a:t>Dr. </a:t>
-            </a:r>
-            <a:r>
-              <a:rPr lang="en-US" b="1" dirty="0" err="1">
-                <a:effectLst/>
-                <a:latin typeface="Times New Roman" panose="02020603050405020304" pitchFamily="18" charset="0"/>
-                <a:ea typeface="Times New Roman" panose="02020603050405020304" pitchFamily="18" charset="0"/>
-                <a:cs typeface="Times New Roman" panose="02020603050405020304" pitchFamily="18" charset="0"/>
-              </a:rPr>
-              <a:t>Sanskruti</a:t>
-            </a:r>
-            <a:r>
-              <a:rPr lang="en-US" b="1" dirty="0">
-                <a:effectLst/>
-                <a:latin typeface="Times New Roman" panose="02020603050405020304" pitchFamily="18" charset="0"/>
-                <a:ea typeface="Times New Roman" panose="02020603050405020304" pitchFamily="18" charset="0"/>
-                <a:cs typeface="Times New Roman" panose="02020603050405020304" pitchFamily="18" charset="0"/>
-              </a:rPr>
-              <a:t> Patel</a:t>
-            </a:r>
-            <a:r>
-              <a:rPr lang="en-US" dirty="0">
-                <a:effectLst/>
-                <a:latin typeface="Times New Roman" panose="02020603050405020304" pitchFamily="18" charset="0"/>
-                <a:ea typeface="Times New Roman" panose="02020603050405020304" pitchFamily="18" charset="0"/>
-                <a:cs typeface="Times New Roman" panose="02020603050405020304" pitchFamily="18" charset="0"/>
-              </a:rPr>
-              <a:t> who advised and gave us moral support through the duration of our project. Without their constant encouragement we could not have been able to achieve what we have.</a:t>
-            </a:r>
-            <a:endParaRPr lang="en-US" dirty="0">
-              <a:effectLst/>
-              <a:latin typeface="Calibri" panose="020F0502020204030204" pitchFamily="34" charset="0"/>
-              <a:ea typeface="Times New Roman" panose="02020603050405020304" pitchFamily="18" charset="0"/>
-              <a:cs typeface="Times New Roman" panose="02020603050405020304" pitchFamily="18" charset="0"/>
-            </a:endParaRPr>
-          </a:p>
-          <a:p>
-            <a:pPr marL="0" marR="0" indent="0" algn="just">
-              <a:spcBef>
-                <a:spcPts val="0"/>
-              </a:spcBef>
-              <a:spcAft>
-                <a:spcPts val="0"/>
-              </a:spcAft>
-            </a:pPr>
-            <a:r>
-              <a:rPr lang="en-US" dirty="0">
-                <a:effectLst/>
-                <a:latin typeface="Times New Roman" panose="02020603050405020304" pitchFamily="18" charset="0"/>
-                <a:ea typeface="Times New Roman" panose="02020603050405020304" pitchFamily="18" charset="0"/>
-                <a:cs typeface="Times New Roman" panose="02020603050405020304" pitchFamily="18" charset="0"/>
-              </a:rPr>
-              <a:t> </a:t>
-            </a:r>
-            <a:endParaRPr lang="en-US" dirty="0">
-              <a:effectLst/>
-              <a:latin typeface="Calibri" panose="020F0502020204030204" pitchFamily="34" charset="0"/>
-              <a:ea typeface="Times New Roman" panose="02020603050405020304" pitchFamily="18" charset="0"/>
-              <a:cs typeface="Times New Roman" panose="02020603050405020304" pitchFamily="18" charset="0"/>
-            </a:endParaRPr>
-          </a:p>
-          <a:p>
-            <a:pPr marL="0" marR="0" indent="0" algn="just">
-              <a:spcBef>
-                <a:spcPts val="0"/>
-              </a:spcBef>
-              <a:spcAft>
-                <a:spcPts val="0"/>
-              </a:spcAft>
-            </a:pPr>
-            <a:r>
-              <a:rPr lang="en-US" dirty="0">
-                <a:effectLst/>
-                <a:latin typeface="Times New Roman" panose="02020603050405020304" pitchFamily="18" charset="0"/>
-                <a:ea typeface="Times New Roman" panose="02020603050405020304" pitchFamily="18" charset="0"/>
-                <a:cs typeface="Times New Roman" panose="02020603050405020304" pitchFamily="18" charset="0"/>
-              </a:rPr>
-              <a:t>It’s our good fortune that we had support and well wishes of many. We are thankful to all and those names which have been forgotten to acknowledge here but contributions have not gone unnoticed.</a:t>
-            </a:r>
-            <a:endParaRPr lang="en-IN" dirty="0"/>
-          </a:p>
-        </p:txBody>
-      </p:sp>
-    </p:spTree>
-    <p:extLst>
-      <p:ext uri="{BB962C8B-B14F-4D97-AF65-F5344CB8AC3E}">
-        <p14:creationId xmlns:p14="http://schemas.microsoft.com/office/powerpoint/2010/main" xmlns="" val="2349520648"/>
-      </p:ext>
-    </p:extLst>
-  </p:cSld>
-  <p:clrMapOvr>
-    <a:masterClrMapping/>
-  </p:clrMapOvr>
-  <mc:AlternateContent xmlns:mc="http://schemas.openxmlformats.org/markup-compatibility/2006">
-    <mc:Choice xmlns:p14="http://schemas.microsoft.com/office/powerpoint/2010/main" xmlns="" Requires="p14">
-      <p:transition spd="slow">
-        <p14:reveal/>
-      </p:transition>
-    </mc:Choice>
-    <mc:Fallback>
-      <p:transition spd="slow">
-        <p:fade/>
-      </p:transition>
-    </mc:Fallback>
-  </mc:AlternateContent>
-</p:sld>
-</file>
-
-<file path=ppt/slides/slide20.xml><?xml version="1.0" encoding="utf-8"?>
+<file path=ppt/slides/slide19.xml><?xml version="1.0" encoding="utf-8"?>
 <p:sld xmlns:a="http://schemas.openxmlformats.org/drawingml/2006/main" xmlns:r="http://schemas.openxmlformats.org/officeDocument/2006/relationships" xmlns:p="http://schemas.openxmlformats.org/presentationml/2006/main">
   <p:cSld>
     <p:spTree>
@@ -4700,7 +4334,7 @@
     </p:spTree>
     <p:extLst>
       <p:ext uri="{BB962C8B-B14F-4D97-AF65-F5344CB8AC3E}">
-        <p14:creationId xmlns:p14="http://schemas.microsoft.com/office/powerpoint/2010/main" xmlns="" val="1012552248"/>
+        <p14:creationId xmlns="" xmlns:p14="http://schemas.microsoft.com/office/powerpoint/2010/main" val="1012552248"/>
       </p:ext>
     </p:extLst>
   </p:cSld>
@@ -4710,7 +4344,248 @@
 </p:sld>
 </file>
 
-<file path=ppt/slides/slide21.xml><?xml version="1.0" encoding="utf-8"?>
+<file path=ppt/slides/slide2.xml><?xml version="1.0" encoding="utf-8"?>
+<p:sld xmlns:a="http://schemas.openxmlformats.org/drawingml/2006/main" xmlns:r="http://schemas.openxmlformats.org/officeDocument/2006/relationships" xmlns:p="http://schemas.openxmlformats.org/presentationml/2006/main">
+  <p:cSld>
+    <p:spTree>
+      <p:nvGrpSpPr>
+        <p:cNvPr id="1" name=""/>
+        <p:cNvGrpSpPr/>
+        <p:nvPr/>
+      </p:nvGrpSpPr>
+      <p:grpSpPr>
+        <a:xfrm>
+          <a:off x="0" y="0"/>
+          <a:ext cx="0" cy="0"/>
+          <a:chOff x="0" y="0"/>
+          <a:chExt cx="0" cy="0"/>
+        </a:xfrm>
+      </p:grpSpPr>
+      <p:sp>
+        <p:nvSpPr>
+          <p:cNvPr id="2" name="Title 1"/>
+          <p:cNvSpPr>
+            <a:spLocks noGrp="1"/>
+          </p:cNvSpPr>
+          <p:nvPr>
+            <p:ph type="title"/>
+          </p:nvPr>
+        </p:nvSpPr>
+        <p:spPr/>
+        <p:txBody>
+          <a:bodyPr/>
+          <a:lstStyle/>
+          <a:p>
+            <a:r>
+              <a:rPr lang="en-US" dirty="0" smtClean="0"/>
+              <a:t>Presentation Contents</a:t>
+            </a:r>
+            <a:endParaRPr lang="en-IN" dirty="0"/>
+          </a:p>
+        </p:txBody>
+      </p:sp>
+      <p:sp>
+        <p:nvSpPr>
+          <p:cNvPr id="3" name="Content Placeholder 2"/>
+          <p:cNvSpPr>
+            <a:spLocks noGrp="1"/>
+          </p:cNvSpPr>
+          <p:nvPr>
+            <p:ph idx="1"/>
+          </p:nvPr>
+        </p:nvSpPr>
+        <p:spPr/>
+        <p:txBody>
+          <a:bodyPr>
+            <a:normAutofit fontScale="70000" lnSpcReduction="20000"/>
+          </a:bodyPr>
+          <a:lstStyle/>
+          <a:p>
+            <a:pPr>
+              <a:spcAft>
+                <a:spcPts val="500"/>
+              </a:spcAft>
+            </a:pPr>
+            <a:endParaRPr lang="en-US" dirty="0"/>
+          </a:p>
+          <a:p>
+            <a:pPr>
+              <a:spcBef>
+                <a:spcPts val="500"/>
+              </a:spcBef>
+              <a:spcAft>
+                <a:spcPts val="500"/>
+              </a:spcAft>
+            </a:pPr>
+            <a:r>
+              <a:rPr lang="en-US" b="1" u="sng" dirty="0" smtClean="0"/>
+              <a:t>Existing System</a:t>
+            </a:r>
+            <a:endParaRPr lang="en-US" b="1" u="sng" dirty="0"/>
+          </a:p>
+          <a:p>
+            <a:pPr>
+              <a:spcBef>
+                <a:spcPts val="500"/>
+              </a:spcBef>
+              <a:spcAft>
+                <a:spcPts val="500"/>
+              </a:spcAft>
+            </a:pPr>
+            <a:r>
+              <a:rPr lang="en-US" b="1" u="sng" dirty="0" smtClean="0"/>
+              <a:t>Proposed System</a:t>
+            </a:r>
+          </a:p>
+          <a:p>
+            <a:pPr>
+              <a:spcBef>
+                <a:spcPts val="500"/>
+              </a:spcBef>
+              <a:spcAft>
+                <a:spcPts val="500"/>
+              </a:spcAft>
+            </a:pPr>
+            <a:r>
+              <a:rPr lang="en-US" b="1" u="sng" dirty="0" smtClean="0"/>
+              <a:t>Diagrams</a:t>
+            </a:r>
+            <a:endParaRPr lang="en-US" b="1" u="sng" dirty="0"/>
+          </a:p>
+          <a:p>
+            <a:pPr lvl="1">
+              <a:spcBef>
+                <a:spcPts val="500"/>
+              </a:spcBef>
+              <a:spcAft>
+                <a:spcPts val="500"/>
+              </a:spcAft>
+              <a:buClr>
+                <a:schemeClr val="accent1"/>
+              </a:buClr>
+            </a:pPr>
+            <a:r>
+              <a:rPr lang="en-IN" b="1" u="sng" dirty="0"/>
+              <a:t> Use Case Diagram</a:t>
+            </a:r>
+          </a:p>
+          <a:p>
+            <a:pPr lvl="1">
+              <a:spcBef>
+                <a:spcPts val="500"/>
+              </a:spcBef>
+              <a:spcAft>
+                <a:spcPts val="500"/>
+              </a:spcAft>
+              <a:buClr>
+                <a:schemeClr val="accent1"/>
+              </a:buClr>
+            </a:pPr>
+            <a:r>
+              <a:rPr lang="en-IN" b="1" u="sng" dirty="0"/>
+              <a:t> Activity </a:t>
+            </a:r>
+            <a:r>
+              <a:rPr lang="en-IN" b="1" u="sng" dirty="0" smtClean="0"/>
+              <a:t>Diagram</a:t>
+            </a:r>
+          </a:p>
+          <a:p>
+            <a:pPr lvl="1">
+              <a:spcBef>
+                <a:spcPts val="500"/>
+              </a:spcBef>
+              <a:spcAft>
+                <a:spcPts val="500"/>
+              </a:spcAft>
+              <a:buClr>
+                <a:schemeClr val="accent1"/>
+              </a:buClr>
+            </a:pPr>
+            <a:r>
+              <a:rPr lang="en-IN" b="1" u="sng" dirty="0" smtClean="0"/>
+              <a:t>Class Diagrams</a:t>
+            </a:r>
+            <a:endParaRPr lang="en-IN" b="1" u="sng" dirty="0"/>
+          </a:p>
+          <a:p>
+            <a:pPr>
+              <a:spcBef>
+                <a:spcPts val="500"/>
+              </a:spcBef>
+              <a:spcAft>
+                <a:spcPts val="500"/>
+              </a:spcAft>
+            </a:pPr>
+            <a:r>
+              <a:rPr lang="en-US" b="1" u="sng" dirty="0" smtClean="0"/>
+              <a:t>Data Dictionary</a:t>
+            </a:r>
+            <a:endParaRPr lang="en-US" b="1" u="sng" dirty="0"/>
+          </a:p>
+          <a:p>
+            <a:pPr>
+              <a:spcBef>
+                <a:spcPts val="500"/>
+              </a:spcBef>
+              <a:spcAft>
+                <a:spcPts val="500"/>
+              </a:spcAft>
+            </a:pPr>
+            <a:r>
+              <a:rPr lang="en-US" b="1" u="sng" dirty="0" smtClean="0"/>
+              <a:t>Screen Layouts</a:t>
+            </a:r>
+          </a:p>
+          <a:p>
+            <a:pPr>
+              <a:spcBef>
+                <a:spcPts val="500"/>
+              </a:spcBef>
+              <a:spcAft>
+                <a:spcPts val="500"/>
+              </a:spcAft>
+            </a:pPr>
+            <a:r>
+              <a:rPr lang="en-US" b="1" u="sng" dirty="0" smtClean="0"/>
+              <a:t>Future Enhancement</a:t>
+            </a:r>
+            <a:endParaRPr lang="en-US" b="1" u="sng" dirty="0"/>
+          </a:p>
+          <a:p>
+            <a:pPr>
+              <a:spcBef>
+                <a:spcPts val="500"/>
+              </a:spcBef>
+              <a:spcAft>
+                <a:spcPts val="500"/>
+              </a:spcAft>
+            </a:pPr>
+            <a:r>
+              <a:rPr lang="en-US" b="1" u="sng" dirty="0" smtClean="0"/>
+              <a:t>Bibliography/References</a:t>
+            </a:r>
+            <a:endParaRPr lang="en-US" b="1" u="sng" dirty="0"/>
+          </a:p>
+          <a:p>
+            <a:endParaRPr lang="en-IN" dirty="0"/>
+          </a:p>
+        </p:txBody>
+      </p:sp>
+    </p:spTree>
+    <p:extLst>
+      <p:ext uri="{BB962C8B-B14F-4D97-AF65-F5344CB8AC3E}">
+        <p14:creationId xmlns="" xmlns:p14="http://schemas.microsoft.com/office/powerpoint/2010/main" val="74855044"/>
+      </p:ext>
+    </p:extLst>
+  </p:cSld>
+  <p:clrMapOvr>
+    <a:masterClrMapping/>
+  </p:clrMapOvr>
+</p:sld>
+</file>
+
+<file path=ppt/slides/slide20.xml><?xml version="1.0" encoding="utf-8"?>
 <p:sld xmlns:a="http://schemas.openxmlformats.org/drawingml/2006/main" xmlns:r="http://schemas.openxmlformats.org/officeDocument/2006/relationships" xmlns:p="http://schemas.openxmlformats.org/presentationml/2006/main">
   <p:cSld>
     <p:spTree>
@@ -4787,7 +4662,7 @@
     </p:spTree>
     <p:extLst>
       <p:ext uri="{BB962C8B-B14F-4D97-AF65-F5344CB8AC3E}">
-        <p14:creationId xmlns:p14="http://schemas.microsoft.com/office/powerpoint/2010/main" xmlns="" val="3057267012"/>
+        <p14:creationId xmlns="" xmlns:p14="http://schemas.microsoft.com/office/powerpoint/2010/main" val="3057267012"/>
       </p:ext>
     </p:extLst>
   </p:cSld>
@@ -4797,7 +4672,7 @@
 </p:sld>
 </file>
 
-<file path=ppt/slides/slide22.xml><?xml version="1.0" encoding="utf-8"?>
+<file path=ppt/slides/slide21.xml><?xml version="1.0" encoding="utf-8"?>
 <p:sld xmlns:a="http://schemas.openxmlformats.org/drawingml/2006/main" xmlns:r="http://schemas.openxmlformats.org/officeDocument/2006/relationships" xmlns:p="http://schemas.openxmlformats.org/presentationml/2006/main">
   <p:cSld>
     <p:spTree>
@@ -4874,7 +4749,7 @@
     </p:spTree>
     <p:extLst>
       <p:ext uri="{BB962C8B-B14F-4D97-AF65-F5344CB8AC3E}">
-        <p14:creationId xmlns:p14="http://schemas.microsoft.com/office/powerpoint/2010/main" xmlns="" val="255879310"/>
+        <p14:creationId xmlns="" xmlns:p14="http://schemas.microsoft.com/office/powerpoint/2010/main" val="255879310"/>
       </p:ext>
     </p:extLst>
   </p:cSld>
@@ -4884,7 +4759,7 @@
 </p:sld>
 </file>
 
-<file path=ppt/slides/slide23.xml><?xml version="1.0" encoding="utf-8"?>
+<file path=ppt/slides/slide22.xml><?xml version="1.0" encoding="utf-8"?>
 <p:sld xmlns:a="http://schemas.openxmlformats.org/drawingml/2006/main" xmlns:r="http://schemas.openxmlformats.org/officeDocument/2006/relationships" xmlns:p="http://schemas.openxmlformats.org/presentationml/2006/main">
   <p:cSld>
     <p:spTree>
@@ -4961,7 +4836,7 @@
     </p:spTree>
     <p:extLst>
       <p:ext uri="{BB962C8B-B14F-4D97-AF65-F5344CB8AC3E}">
-        <p14:creationId xmlns:p14="http://schemas.microsoft.com/office/powerpoint/2010/main" xmlns="" val="20460872"/>
+        <p14:creationId xmlns="" xmlns:p14="http://schemas.microsoft.com/office/powerpoint/2010/main" val="20460872"/>
       </p:ext>
     </p:extLst>
   </p:cSld>
@@ -4971,7 +4846,7 @@
 </p:sld>
 </file>
 
-<file path=ppt/slides/slide24.xml><?xml version="1.0" encoding="utf-8"?>
+<file path=ppt/slides/slide23.xml><?xml version="1.0" encoding="utf-8"?>
 <p:sld xmlns:a="http://schemas.openxmlformats.org/drawingml/2006/main" xmlns:r="http://schemas.openxmlformats.org/officeDocument/2006/relationships" xmlns:p="http://schemas.openxmlformats.org/presentationml/2006/main">
   <p:cSld>
     <p:spTree>
@@ -5053,7 +4928,7 @@
     </p:spTree>
     <p:extLst>
       <p:ext uri="{BB962C8B-B14F-4D97-AF65-F5344CB8AC3E}">
-        <p14:creationId xmlns:p14="http://schemas.microsoft.com/office/powerpoint/2010/main" xmlns="" val="2127697322"/>
+        <p14:creationId xmlns="" xmlns:p14="http://schemas.microsoft.com/office/powerpoint/2010/main" val="2127697322"/>
       </p:ext>
     </p:extLst>
   </p:cSld>
@@ -5063,7 +4938,7 @@
 </p:sld>
 </file>
 
-<file path=ppt/slides/slide25.xml><?xml version="1.0" encoding="utf-8"?>
+<file path=ppt/slides/slide24.xml><?xml version="1.0" encoding="utf-8"?>
 <p:sld xmlns:a="http://schemas.openxmlformats.org/drawingml/2006/main" xmlns:r="http://schemas.openxmlformats.org/officeDocument/2006/relationships" xmlns:p="http://schemas.openxmlformats.org/presentationml/2006/main">
   <p:cSld>
     <p:spTree>
@@ -5145,7 +5020,7 @@
     </p:spTree>
     <p:extLst>
       <p:ext uri="{BB962C8B-B14F-4D97-AF65-F5344CB8AC3E}">
-        <p14:creationId xmlns:p14="http://schemas.microsoft.com/office/powerpoint/2010/main" xmlns="" val="1164689808"/>
+        <p14:creationId xmlns="" xmlns:p14="http://schemas.microsoft.com/office/powerpoint/2010/main" val="1164689808"/>
       </p:ext>
     </p:extLst>
   </p:cSld>
@@ -5155,7 +5030,7 @@
 </p:sld>
 </file>
 
-<file path=ppt/slides/slide26.xml><?xml version="1.0" encoding="utf-8"?>
+<file path=ppt/slides/slide25.xml><?xml version="1.0" encoding="utf-8"?>
 <p:sld xmlns:a="http://schemas.openxmlformats.org/drawingml/2006/main" xmlns:r="http://schemas.openxmlformats.org/officeDocument/2006/relationships" xmlns:p="http://schemas.openxmlformats.org/presentationml/2006/main">
   <p:cSld>
     <p:spTree>
@@ -5232,7 +5107,7 @@
     </p:spTree>
     <p:extLst>
       <p:ext uri="{BB962C8B-B14F-4D97-AF65-F5344CB8AC3E}">
-        <p14:creationId xmlns:p14="http://schemas.microsoft.com/office/powerpoint/2010/main" xmlns="" val="3061481452"/>
+        <p14:creationId xmlns="" xmlns:p14="http://schemas.microsoft.com/office/powerpoint/2010/main" val="3061481452"/>
       </p:ext>
     </p:extLst>
   </p:cSld>
@@ -5242,7 +5117,7 @@
 </p:sld>
 </file>
 
-<file path=ppt/slides/slide27.xml><?xml version="1.0" encoding="utf-8"?>
+<file path=ppt/slides/slide26.xml><?xml version="1.0" encoding="utf-8"?>
 <p:sld xmlns:a="http://schemas.openxmlformats.org/drawingml/2006/main" xmlns:r="http://schemas.openxmlformats.org/officeDocument/2006/relationships" xmlns:p="http://schemas.openxmlformats.org/presentationml/2006/main">
   <p:cSld>
     <p:spTree>
@@ -5323,7 +5198,7 @@
     </p:spTree>
     <p:extLst>
       <p:ext uri="{BB962C8B-B14F-4D97-AF65-F5344CB8AC3E}">
-        <p14:creationId xmlns:p14="http://schemas.microsoft.com/office/powerpoint/2010/main" xmlns="" val="997643233"/>
+        <p14:creationId xmlns="" xmlns:p14="http://schemas.microsoft.com/office/powerpoint/2010/main" val="997643233"/>
       </p:ext>
     </p:extLst>
   </p:cSld>
@@ -5333,7 +5208,7 @@
 </p:sld>
 </file>
 
-<file path=ppt/slides/slide28.xml><?xml version="1.0" encoding="utf-8"?>
+<file path=ppt/slides/slide27.xml><?xml version="1.0" encoding="utf-8"?>
 <p:sld xmlns:a="http://schemas.openxmlformats.org/drawingml/2006/main" xmlns:r="http://schemas.openxmlformats.org/officeDocument/2006/relationships" xmlns:p="http://schemas.openxmlformats.org/presentationml/2006/main">
   <p:cSld>
     <p:spTree>
@@ -5415,7 +5290,7 @@
     </p:spTree>
     <p:extLst>
       <p:ext uri="{BB962C8B-B14F-4D97-AF65-F5344CB8AC3E}">
-        <p14:creationId xmlns:p14="http://schemas.microsoft.com/office/powerpoint/2010/main" xmlns="" val="3168605083"/>
+        <p14:creationId xmlns="" xmlns:p14="http://schemas.microsoft.com/office/powerpoint/2010/main" val="3168605083"/>
       </p:ext>
     </p:extLst>
   </p:cSld>
@@ -5425,7 +5300,7 @@
 </p:sld>
 </file>
 
-<file path=ppt/slides/slide29.xml><?xml version="1.0" encoding="utf-8"?>
+<file path=ppt/slides/slide28.xml><?xml version="1.0" encoding="utf-8"?>
 <p:sld xmlns:a="http://schemas.openxmlformats.org/drawingml/2006/main" xmlns:r="http://schemas.openxmlformats.org/officeDocument/2006/relationships" xmlns:p="http://schemas.openxmlformats.org/presentationml/2006/main">
   <p:cSld>
     <p:spTree>
@@ -5502,7 +5377,7 @@
     </p:spTree>
     <p:extLst>
       <p:ext uri="{BB962C8B-B14F-4D97-AF65-F5344CB8AC3E}">
-        <p14:creationId xmlns:p14="http://schemas.microsoft.com/office/powerpoint/2010/main" xmlns="" val="900418446"/>
+        <p14:creationId xmlns="" xmlns:p14="http://schemas.microsoft.com/office/powerpoint/2010/main" val="900418446"/>
       </p:ext>
     </p:extLst>
   </p:cSld>
@@ -5512,298 +5387,7 @@
 </p:sld>
 </file>
 
-<file path=ppt/slides/slide3.xml><?xml version="1.0" encoding="utf-8"?>
-<p:sld xmlns:a="http://schemas.openxmlformats.org/drawingml/2006/main" xmlns:r="http://schemas.openxmlformats.org/officeDocument/2006/relationships" xmlns:p="http://schemas.openxmlformats.org/presentationml/2006/main">
-  <p:cSld>
-    <p:spTree>
-      <p:nvGrpSpPr>
-        <p:cNvPr id="1" name=""/>
-        <p:cNvGrpSpPr/>
-        <p:nvPr/>
-      </p:nvGrpSpPr>
-      <p:grpSpPr>
-        <a:xfrm>
-          <a:off x="0" y="0"/>
-          <a:ext cx="0" cy="0"/>
-          <a:chOff x="0" y="0"/>
-          <a:chExt cx="0" cy="0"/>
-        </a:xfrm>
-      </p:grpSpPr>
-      <p:sp>
-        <p:nvSpPr>
-          <p:cNvPr id="2" name="Title 1"/>
-          <p:cNvSpPr>
-            <a:spLocks noGrp="1"/>
-          </p:cNvSpPr>
-          <p:nvPr>
-            <p:ph type="title"/>
-          </p:nvPr>
-        </p:nvSpPr>
-        <p:spPr/>
-        <p:txBody>
-          <a:bodyPr/>
-          <a:lstStyle/>
-          <a:p>
-            <a:endParaRPr lang="en-IN"/>
-          </a:p>
-        </p:txBody>
-      </p:sp>
-      <p:sp>
-        <p:nvSpPr>
-          <p:cNvPr id="3" name="Content Placeholder 2"/>
-          <p:cNvSpPr>
-            <a:spLocks noGrp="1"/>
-          </p:cNvSpPr>
-          <p:nvPr>
-            <p:ph idx="1"/>
-          </p:nvPr>
-        </p:nvSpPr>
-        <p:spPr/>
-        <p:txBody>
-          <a:bodyPr>
-            <a:normAutofit fontScale="77500" lnSpcReduction="20000"/>
-          </a:bodyPr>
-          <a:lstStyle/>
-          <a:p>
-            <a:pPr>
-              <a:spcAft>
-                <a:spcPts val="500"/>
-              </a:spcAft>
-            </a:pPr>
-            <a:endParaRPr lang="en-US" dirty="0">
-              <a:solidFill>
-                <a:schemeClr val="tx1"/>
-              </a:solidFill>
-            </a:endParaRPr>
-          </a:p>
-          <a:p>
-            <a:pPr>
-              <a:spcBef>
-                <a:spcPts val="500"/>
-              </a:spcBef>
-              <a:spcAft>
-                <a:spcPts val="500"/>
-              </a:spcAft>
-              <a:buFont typeface="Wingdings" pitchFamily="2" charset="2"/>
-              <a:buChar char="q"/>
-            </a:pPr>
-            <a:r>
-              <a:rPr lang="en-US" b="1" dirty="0"/>
-              <a:t> </a:t>
-            </a:r>
-            <a:r>
-              <a:rPr lang="en-US" b="1" dirty="0">
-                <a:hlinkClick r:id="" action="ppaction://noaction">
-                  <a:extLst>
-                    <a:ext uri="{A12FA001-AC4F-418D-AE19-62706E023703}">
-                      <ahyp:hlinkClr xmlns:ahyp="http://schemas.microsoft.com/office/drawing/2018/hyperlinkcolor" xmlns="" val="tx"/>
-                    </a:ext>
-                  </a:extLst>
-                </a:hlinkClick>
-              </a:rPr>
-              <a:t>Existing System</a:t>
-            </a:r>
-            <a:endParaRPr lang="en-US" b="1" dirty="0"/>
-          </a:p>
-          <a:p>
-            <a:pPr>
-              <a:spcBef>
-                <a:spcPts val="500"/>
-              </a:spcBef>
-              <a:spcAft>
-                <a:spcPts val="500"/>
-              </a:spcAft>
-              <a:buFont typeface="Wingdings" pitchFamily="2" charset="2"/>
-              <a:buChar char="q"/>
-            </a:pPr>
-            <a:r>
-              <a:rPr lang="en-US" b="1" dirty="0"/>
-              <a:t> </a:t>
-            </a:r>
-            <a:r>
-              <a:rPr lang="en-US" b="1" dirty="0">
-                <a:hlinkClick r:id="" action="ppaction://noaction">
-                  <a:extLst>
-                    <a:ext uri="{A12FA001-AC4F-418D-AE19-62706E023703}">
-                      <ahyp:hlinkClr xmlns:ahyp="http://schemas.microsoft.com/office/drawing/2018/hyperlinkcolor" xmlns="" val="tx"/>
-                    </a:ext>
-                  </a:extLst>
-                </a:hlinkClick>
-              </a:rPr>
-              <a:t>Proposed System</a:t>
-            </a:r>
-            <a:endParaRPr lang="en-US" b="1" dirty="0"/>
-          </a:p>
-          <a:p>
-            <a:pPr>
-              <a:spcBef>
-                <a:spcPts val="500"/>
-              </a:spcBef>
-              <a:spcAft>
-                <a:spcPts val="500"/>
-              </a:spcAft>
-              <a:buClr>
-                <a:schemeClr val="accent1"/>
-              </a:buClr>
-              <a:buFont typeface="Wingdings" pitchFamily="2" charset="2"/>
-              <a:buChar char="q"/>
-            </a:pPr>
-            <a:r>
-              <a:rPr lang="en-IN" b="1" dirty="0"/>
-              <a:t> </a:t>
-            </a:r>
-            <a:r>
-              <a:rPr lang="en-IN" b="1" u="sng" dirty="0"/>
-              <a:t>Use Case Diagram</a:t>
-            </a:r>
-          </a:p>
-          <a:p>
-            <a:pPr>
-              <a:spcBef>
-                <a:spcPts val="500"/>
-              </a:spcBef>
-              <a:spcAft>
-                <a:spcPts val="500"/>
-              </a:spcAft>
-              <a:buClr>
-                <a:schemeClr val="accent1"/>
-              </a:buClr>
-              <a:buFont typeface="Wingdings" pitchFamily="2" charset="2"/>
-              <a:buChar char="q"/>
-            </a:pPr>
-            <a:r>
-              <a:rPr lang="en-IN" b="1" u="sng" dirty="0"/>
-              <a:t> Activity Diagram</a:t>
-            </a:r>
-          </a:p>
-          <a:p>
-            <a:pPr>
-              <a:spcBef>
-                <a:spcPts val="500"/>
-              </a:spcBef>
-              <a:spcAft>
-                <a:spcPts val="500"/>
-              </a:spcAft>
-              <a:buClr>
-                <a:schemeClr val="accent1"/>
-              </a:buClr>
-              <a:buFont typeface="Wingdings" pitchFamily="2" charset="2"/>
-              <a:buChar char="q"/>
-            </a:pPr>
-            <a:r>
-              <a:rPr lang="en-IN" b="1" u="sng" dirty="0"/>
-              <a:t> Class Diagram</a:t>
-            </a:r>
-          </a:p>
-          <a:p>
-            <a:pPr>
-              <a:spcBef>
-                <a:spcPts val="500"/>
-              </a:spcBef>
-              <a:spcAft>
-                <a:spcPts val="500"/>
-              </a:spcAft>
-              <a:buFont typeface="Wingdings" pitchFamily="2" charset="2"/>
-              <a:buChar char="q"/>
-            </a:pPr>
-            <a:r>
-              <a:rPr lang="en-US" b="1" dirty="0"/>
-              <a:t> </a:t>
-            </a:r>
-            <a:r>
-              <a:rPr lang="en-US" b="1" dirty="0">
-                <a:hlinkClick r:id="" action="ppaction://noaction">
-                  <a:extLst>
-                    <a:ext uri="{A12FA001-AC4F-418D-AE19-62706E023703}">
-                      <ahyp:hlinkClr xmlns:ahyp="http://schemas.microsoft.com/office/drawing/2018/hyperlinkcolor" xmlns="" val="tx"/>
-                    </a:ext>
-                  </a:extLst>
-                </a:hlinkClick>
-              </a:rPr>
-              <a:t>Data dictionaries</a:t>
-            </a:r>
-            <a:endParaRPr lang="en-US" b="1" dirty="0"/>
-          </a:p>
-          <a:p>
-            <a:pPr>
-              <a:spcBef>
-                <a:spcPts val="500"/>
-              </a:spcBef>
-              <a:spcAft>
-                <a:spcPts val="500"/>
-              </a:spcAft>
-              <a:buFont typeface="Wingdings" pitchFamily="2" charset="2"/>
-              <a:buChar char="q"/>
-            </a:pPr>
-            <a:r>
-              <a:rPr lang="en-US" b="1" dirty="0"/>
-              <a:t> </a:t>
-            </a:r>
-            <a:r>
-              <a:rPr lang="en-US" b="1" dirty="0">
-                <a:hlinkClick r:id="" action="ppaction://noaction">
-                  <a:extLst>
-                    <a:ext uri="{A12FA001-AC4F-418D-AE19-62706E023703}">
-                      <ahyp:hlinkClr xmlns:ahyp="http://schemas.microsoft.com/office/drawing/2018/hyperlinkcolor" xmlns="" val="tx"/>
-                    </a:ext>
-                  </a:extLst>
-                </a:hlinkClick>
-              </a:rPr>
-              <a:t>Screen Layout</a:t>
-            </a:r>
-            <a:endParaRPr lang="en-US" b="1" dirty="0"/>
-          </a:p>
-          <a:p>
-            <a:pPr>
-              <a:spcBef>
-                <a:spcPts val="500"/>
-              </a:spcBef>
-              <a:spcAft>
-                <a:spcPts val="500"/>
-              </a:spcAft>
-              <a:buFont typeface="Wingdings" pitchFamily="2" charset="2"/>
-              <a:buChar char="q"/>
-            </a:pPr>
-            <a:r>
-              <a:rPr lang="en-US" b="1" dirty="0"/>
-              <a:t>Future Enhancement</a:t>
-            </a:r>
-          </a:p>
-          <a:p>
-            <a:pPr>
-              <a:spcBef>
-                <a:spcPts val="500"/>
-              </a:spcBef>
-              <a:spcAft>
-                <a:spcPts val="500"/>
-              </a:spcAft>
-              <a:buFont typeface="Wingdings" pitchFamily="2" charset="2"/>
-              <a:buChar char="q"/>
-            </a:pPr>
-            <a:r>
-              <a:rPr lang="en-US" b="1" dirty="0"/>
-              <a:t> Bibliography/References</a:t>
-            </a:r>
-          </a:p>
-          <a:p>
-            <a:endParaRPr lang="en-IN" dirty="0"/>
-          </a:p>
-        </p:txBody>
-      </p:sp>
-    </p:spTree>
-    <p:extLst>
-      <p:ext uri="{BB962C8B-B14F-4D97-AF65-F5344CB8AC3E}">
-        <p14:creationId xmlns:p14="http://schemas.microsoft.com/office/powerpoint/2010/main" xmlns="" val="74855044"/>
-      </p:ext>
-    </p:extLst>
-  </p:cSld>
-  <p:clrMapOvr>
-    <a:masterClrMapping/>
-  </p:clrMapOvr>
-</p:sld>
-</file>
-
-<file path=ppt/slides/slide30.xml><?xml version="1.0" encoding="utf-8"?>
+<file path=ppt/slides/slide29.xml><?xml version="1.0" encoding="utf-8"?>
 <p:sld xmlns:a="http://schemas.openxmlformats.org/drawingml/2006/main" xmlns:r="http://schemas.openxmlformats.org/officeDocument/2006/relationships" xmlns:p="http://schemas.openxmlformats.org/presentationml/2006/main">
   <p:cSld>
     <p:spTree>
@@ -5880,7 +5464,7 @@
     </p:spTree>
     <p:extLst>
       <p:ext uri="{BB962C8B-B14F-4D97-AF65-F5344CB8AC3E}">
-        <p14:creationId xmlns:p14="http://schemas.microsoft.com/office/powerpoint/2010/main" xmlns="" val="1583451691"/>
+        <p14:creationId xmlns="" xmlns:p14="http://schemas.microsoft.com/office/powerpoint/2010/main" val="1583451691"/>
       </p:ext>
     </p:extLst>
   </p:cSld>
@@ -5890,7 +5474,231 @@
 </p:sld>
 </file>
 
-<file path=ppt/slides/slide31.xml><?xml version="1.0" encoding="utf-8"?>
+<file path=ppt/slides/slide3.xml><?xml version="1.0" encoding="utf-8"?>
+<p:sld xmlns:a="http://schemas.openxmlformats.org/drawingml/2006/main" xmlns:r="http://schemas.openxmlformats.org/officeDocument/2006/relationships" xmlns:p="http://schemas.openxmlformats.org/presentationml/2006/main">
+  <p:cSld>
+    <p:spTree>
+      <p:nvGrpSpPr>
+        <p:cNvPr id="1" name=""/>
+        <p:cNvGrpSpPr/>
+        <p:nvPr/>
+      </p:nvGrpSpPr>
+      <p:grpSpPr>
+        <a:xfrm>
+          <a:off x="0" y="0"/>
+          <a:ext cx="0" cy="0"/>
+          <a:chOff x="0" y="0"/>
+          <a:chExt cx="0" cy="0"/>
+        </a:xfrm>
+      </p:grpSpPr>
+      <p:sp>
+        <p:nvSpPr>
+          <p:cNvPr id="2" name="Title 1"/>
+          <p:cNvSpPr>
+            <a:spLocks noGrp="1"/>
+          </p:cNvSpPr>
+          <p:nvPr>
+            <p:ph type="title"/>
+          </p:nvPr>
+        </p:nvSpPr>
+        <p:spPr/>
+        <p:txBody>
+          <a:bodyPr/>
+          <a:lstStyle/>
+          <a:p>
+            <a:r>
+              <a:rPr lang="en-US" dirty="0"/>
+              <a:t>Project Profile</a:t>
+            </a:r>
+            <a:endParaRPr lang="en-IN" dirty="0"/>
+          </a:p>
+        </p:txBody>
+      </p:sp>
+      <p:sp>
+        <p:nvSpPr>
+          <p:cNvPr id="3" name="Content Placeholder 2"/>
+          <p:cNvSpPr>
+            <a:spLocks noGrp="1"/>
+          </p:cNvSpPr>
+          <p:nvPr>
+            <p:ph idx="1"/>
+          </p:nvPr>
+        </p:nvSpPr>
+        <p:spPr/>
+        <p:txBody>
+          <a:bodyPr>
+            <a:normAutofit fontScale="77500" lnSpcReduction="20000"/>
+          </a:bodyPr>
+          <a:lstStyle/>
+          <a:p>
+            <a:r>
+              <a:rPr lang="en-US" b="1" dirty="0">
+                <a:latin typeface="Times New Roman" panose="02020603050405020304" pitchFamily="18" charset="0"/>
+                <a:cs typeface="Times New Roman" panose="02020603050405020304" pitchFamily="18" charset="0"/>
+              </a:rPr>
+              <a:t>Project Name: </a:t>
+            </a:r>
+            <a:r>
+              <a:rPr lang="en-US" dirty="0">
+                <a:latin typeface="Times New Roman" panose="02020603050405020304" pitchFamily="18" charset="0"/>
+                <a:cs typeface="Times New Roman" panose="02020603050405020304" pitchFamily="18" charset="0"/>
+              </a:rPr>
+              <a:t>Campus Placement Recruitment System</a:t>
+            </a:r>
+            <a:endParaRPr lang="en-IN" dirty="0">
+              <a:latin typeface="Times New Roman" panose="02020603050405020304" pitchFamily="18" charset="0"/>
+              <a:cs typeface="Times New Roman" panose="02020603050405020304" pitchFamily="18" charset="0"/>
+            </a:endParaRPr>
+          </a:p>
+          <a:p>
+            <a:r>
+              <a:rPr lang="en-US" b="1" dirty="0">
+                <a:latin typeface="Times New Roman" panose="02020603050405020304" pitchFamily="18" charset="0"/>
+                <a:cs typeface="Times New Roman" panose="02020603050405020304" pitchFamily="18" charset="0"/>
+              </a:rPr>
+              <a:t>Type of Application:</a:t>
+            </a:r>
+            <a:r>
+              <a:rPr lang="en-US" dirty="0">
+                <a:latin typeface="Times New Roman" panose="02020603050405020304" pitchFamily="18" charset="0"/>
+                <a:cs typeface="Times New Roman" panose="02020603050405020304" pitchFamily="18" charset="0"/>
+              </a:rPr>
+              <a:t> Web Application</a:t>
+            </a:r>
+            <a:endParaRPr lang="en-IN" dirty="0">
+              <a:latin typeface="Times New Roman" panose="02020603050405020304" pitchFamily="18" charset="0"/>
+              <a:cs typeface="Times New Roman" panose="02020603050405020304" pitchFamily="18" charset="0"/>
+            </a:endParaRPr>
+          </a:p>
+          <a:p>
+            <a:r>
+              <a:rPr lang="en-US" b="1" dirty="0">
+                <a:latin typeface="Times New Roman" panose="02020603050405020304" pitchFamily="18" charset="0"/>
+                <a:cs typeface="Times New Roman" panose="02020603050405020304" pitchFamily="18" charset="0"/>
+              </a:rPr>
+              <a:t>Project Description: </a:t>
+            </a:r>
+            <a:r>
+              <a:rPr lang="en-US" dirty="0">
+                <a:latin typeface="Times New Roman" panose="02020603050405020304" pitchFamily="18" charset="0"/>
+                <a:cs typeface="Times New Roman" panose="02020603050405020304" pitchFamily="18" charset="0"/>
+              </a:rPr>
+              <a:t>This Project is aimed at developing an web application for the training and Placement Department of the College. The system is a web application that can be accessed </a:t>
+            </a:r>
+            <a:r>
+              <a:rPr lang="en-US" dirty="0" smtClean="0">
+                <a:latin typeface="Times New Roman" panose="02020603050405020304" pitchFamily="18" charset="0"/>
+                <a:cs typeface="Times New Roman" panose="02020603050405020304" pitchFamily="18" charset="0"/>
+              </a:rPr>
+              <a:t>with </a:t>
+            </a:r>
+            <a:r>
+              <a:rPr lang="en-US" dirty="0">
+                <a:latin typeface="Times New Roman" panose="02020603050405020304" pitchFamily="18" charset="0"/>
+                <a:cs typeface="Times New Roman" panose="02020603050405020304" pitchFamily="18" charset="0"/>
+              </a:rPr>
+              <a:t>proper login provide.</a:t>
+            </a:r>
+            <a:endParaRPr lang="en-IN" dirty="0">
+              <a:latin typeface="Times New Roman" panose="02020603050405020304" pitchFamily="18" charset="0"/>
+              <a:cs typeface="Times New Roman" panose="02020603050405020304" pitchFamily="18" charset="0"/>
+            </a:endParaRPr>
+          </a:p>
+          <a:p>
+            <a:r>
+              <a:rPr lang="en-US" b="1" dirty="0">
+                <a:latin typeface="Times New Roman" panose="02020603050405020304" pitchFamily="18" charset="0"/>
+                <a:cs typeface="Times New Roman" panose="02020603050405020304" pitchFamily="18" charset="0"/>
+              </a:rPr>
+              <a:t>Team Size:3 PEOPLE</a:t>
+            </a:r>
+            <a:r>
+              <a:rPr lang="en-US" dirty="0">
+                <a:latin typeface="Times New Roman" panose="02020603050405020304" pitchFamily="18" charset="0"/>
+                <a:cs typeface="Times New Roman" panose="02020603050405020304" pitchFamily="18" charset="0"/>
+              </a:rPr>
+              <a:t>	</a:t>
+            </a:r>
+            <a:endParaRPr lang="en-IN" dirty="0">
+              <a:latin typeface="Times New Roman" panose="02020603050405020304" pitchFamily="18" charset="0"/>
+              <a:cs typeface="Times New Roman" panose="02020603050405020304" pitchFamily="18" charset="0"/>
+            </a:endParaRPr>
+          </a:p>
+          <a:p>
+            <a:r>
+              <a:rPr lang="en-US" b="1" dirty="0">
+                <a:latin typeface="Times New Roman" panose="02020603050405020304" pitchFamily="18" charset="0"/>
+                <a:cs typeface="Times New Roman" panose="02020603050405020304" pitchFamily="18" charset="0"/>
+              </a:rPr>
+              <a:t>Front End: HTML,CSS,JAVASCRIPT </a:t>
+            </a:r>
+            <a:endParaRPr lang="en-IN" dirty="0">
+              <a:latin typeface="Times New Roman" panose="02020603050405020304" pitchFamily="18" charset="0"/>
+              <a:cs typeface="Times New Roman" panose="02020603050405020304" pitchFamily="18" charset="0"/>
+            </a:endParaRPr>
+          </a:p>
+          <a:p>
+            <a:r>
+              <a:rPr lang="en-US" b="1" dirty="0">
+                <a:latin typeface="Times New Roman" panose="02020603050405020304" pitchFamily="18" charset="0"/>
+                <a:cs typeface="Times New Roman" panose="02020603050405020304" pitchFamily="18" charset="0"/>
+              </a:rPr>
+              <a:t>Back End: DJANGO</a:t>
+            </a:r>
+            <a:endParaRPr lang="en-IN" dirty="0">
+              <a:latin typeface="Times New Roman" panose="02020603050405020304" pitchFamily="18" charset="0"/>
+              <a:cs typeface="Times New Roman" panose="02020603050405020304" pitchFamily="18" charset="0"/>
+            </a:endParaRPr>
+          </a:p>
+          <a:p>
+            <a:r>
+              <a:rPr lang="en-US" b="1" dirty="0">
+                <a:latin typeface="Times New Roman" panose="02020603050405020304" pitchFamily="18" charset="0"/>
+                <a:cs typeface="Times New Roman" panose="02020603050405020304" pitchFamily="18" charset="0"/>
+              </a:rPr>
+              <a:t>Database: SQLITE 3</a:t>
+            </a:r>
+            <a:r>
+              <a:rPr lang="en-US" dirty="0">
+                <a:latin typeface="Times New Roman" panose="02020603050405020304" pitchFamily="18" charset="0"/>
+                <a:cs typeface="Times New Roman" panose="02020603050405020304" pitchFamily="18" charset="0"/>
+              </a:rPr>
+              <a:t>	</a:t>
+            </a:r>
+            <a:endParaRPr lang="en-IN" dirty="0">
+              <a:latin typeface="Times New Roman" panose="02020603050405020304" pitchFamily="18" charset="0"/>
+              <a:cs typeface="Times New Roman" panose="02020603050405020304" pitchFamily="18" charset="0"/>
+            </a:endParaRPr>
+          </a:p>
+          <a:p>
+            <a:r>
+              <a:rPr lang="en-US" b="1" dirty="0">
+                <a:latin typeface="Times New Roman" panose="02020603050405020304" pitchFamily="18" charset="0"/>
+                <a:cs typeface="Times New Roman" panose="02020603050405020304" pitchFamily="18" charset="0"/>
+              </a:rPr>
+              <a:t>Tools used: VISUAL STUDIO CODE</a:t>
+            </a:r>
+            <a:endParaRPr lang="en-IN" dirty="0">
+              <a:latin typeface="Times New Roman" panose="02020603050405020304" pitchFamily="18" charset="0"/>
+              <a:cs typeface="Times New Roman" panose="02020603050405020304" pitchFamily="18" charset="0"/>
+            </a:endParaRPr>
+          </a:p>
+        </p:txBody>
+      </p:sp>
+    </p:spTree>
+    <p:extLst>
+      <p:ext uri="{BB962C8B-B14F-4D97-AF65-F5344CB8AC3E}">
+        <p14:creationId xmlns="" xmlns:p14="http://schemas.microsoft.com/office/powerpoint/2010/main" val="1468528787"/>
+      </p:ext>
+    </p:extLst>
+  </p:cSld>
+  <p:clrMapOvr>
+    <a:masterClrMapping/>
+  </p:clrMapOvr>
+</p:sld>
+</file>
+
+<file path=ppt/slides/slide30.xml><?xml version="1.0" encoding="utf-8"?>
 <p:sld xmlns:a="http://schemas.openxmlformats.org/drawingml/2006/main" xmlns:r="http://schemas.openxmlformats.org/officeDocument/2006/relationships" xmlns:p="http://schemas.openxmlformats.org/presentationml/2006/main">
   <p:cSld>
     <p:spTree>
@@ -5967,7 +5775,93 @@
     </p:spTree>
     <p:extLst>
       <p:ext uri="{BB962C8B-B14F-4D97-AF65-F5344CB8AC3E}">
-        <p14:creationId xmlns:p14="http://schemas.microsoft.com/office/powerpoint/2010/main" xmlns="" val="208023682"/>
+        <p14:creationId xmlns="" xmlns:p14="http://schemas.microsoft.com/office/powerpoint/2010/main" val="208023682"/>
+      </p:ext>
+    </p:extLst>
+  </p:cSld>
+  <p:clrMapOvr>
+    <a:masterClrMapping/>
+  </p:clrMapOvr>
+</p:sld>
+</file>
+
+<file path=ppt/slides/slide31.xml><?xml version="1.0" encoding="utf-8"?>
+<p:sld xmlns:a="http://schemas.openxmlformats.org/drawingml/2006/main" xmlns:r="http://schemas.openxmlformats.org/officeDocument/2006/relationships" xmlns:p="http://schemas.openxmlformats.org/presentationml/2006/main">
+  <p:cSld>
+    <p:spTree>
+      <p:nvGrpSpPr>
+        <p:cNvPr id="1" name=""/>
+        <p:cNvGrpSpPr/>
+        <p:nvPr/>
+      </p:nvGrpSpPr>
+      <p:grpSpPr>
+        <a:xfrm>
+          <a:off x="0" y="0"/>
+          <a:ext cx="0" cy="0"/>
+          <a:chOff x="0" y="0"/>
+          <a:chExt cx="0" cy="0"/>
+        </a:xfrm>
+      </p:grpSpPr>
+      <p:sp>
+        <p:nvSpPr>
+          <p:cNvPr id="2" name="Title 1"/>
+          <p:cNvSpPr>
+            <a:spLocks noGrp="1"/>
+          </p:cNvSpPr>
+          <p:nvPr>
+            <p:ph type="title"/>
+          </p:nvPr>
+        </p:nvSpPr>
+        <p:spPr/>
+        <p:txBody>
+          <a:bodyPr/>
+          <a:lstStyle/>
+          <a:p>
+            <a:r>
+              <a:rPr lang="en-US" dirty="0"/>
+              <a:t>Placement Drive</a:t>
+            </a:r>
+            <a:endParaRPr lang="en-IN" dirty="0"/>
+          </a:p>
+        </p:txBody>
+      </p:sp>
+      <p:pic>
+        <p:nvPicPr>
+          <p:cNvPr id="2050" name="Picture 2"/>
+          <p:cNvPicPr>
+            <a:picLocks noChangeAspect="1" noChangeArrowheads="1"/>
+          </p:cNvPicPr>
+          <p:nvPr/>
+        </p:nvPicPr>
+        <p:blipFill>
+          <a:blip r:embed="rId2"/>
+          <a:srcRect/>
+          <a:stretch>
+            <a:fillRect/>
+          </a:stretch>
+        </p:blipFill>
+        <p:spPr bwMode="auto">
+          <a:xfrm>
+            <a:off x="304800" y="1676400"/>
+            <a:ext cx="8534400" cy="4067175"/>
+          </a:xfrm>
+          <a:prstGeom prst="rect">
+            <a:avLst/>
+          </a:prstGeom>
+          <a:noFill/>
+          <a:ln w="9525">
+            <a:noFill/>
+            <a:miter lim="800000"/>
+            <a:headEnd/>
+            <a:tailEnd/>
+          </a:ln>
+          <a:effectLst/>
+        </p:spPr>
+      </p:pic>
+    </p:spTree>
+    <p:extLst>
+      <p:ext uri="{BB962C8B-B14F-4D97-AF65-F5344CB8AC3E}">
+        <p14:creationId xmlns="" xmlns:p14="http://schemas.microsoft.com/office/powerpoint/2010/main" val="1978132826"/>
       </p:ext>
     </p:extLst>
   </p:cSld>
@@ -6010,22 +5904,24 @@
           <a:lstStyle/>
           <a:p>
             <a:r>
-              <a:rPr lang="en-US" dirty="0"/>
-              <a:t>Placement Drive</a:t>
-            </a:r>
-            <a:endParaRPr lang="en-IN" dirty="0"/>
+              <a:rPr lang="en-US" dirty="0" smtClean="0"/>
+              <a:t>Placement </a:t>
+            </a:r>
+            <a:r>
+              <a:rPr lang="en-US" dirty="0" smtClean="0"/>
+              <a:t>Report</a:t>
+            </a:r>
+            <a:endParaRPr lang="en-US" dirty="0"/>
           </a:p>
         </p:txBody>
       </p:sp>
       <p:pic>
         <p:nvPicPr>
-          <p:cNvPr id="4" name="Content Placeholder 3"/>
+          <p:cNvPr id="3074" name="Picture 2"/>
           <p:cNvPicPr>
-            <a:picLocks noGrp="1"/>
+            <a:picLocks noChangeAspect="1" noChangeArrowheads="1"/>
           </p:cNvPicPr>
-          <p:nvPr>
-            <p:ph idx="1"/>
-          </p:nvPr>
+          <p:nvPr/>
         </p:nvPicPr>
         <p:blipFill>
           <a:blip r:embed="rId2"/>
@@ -6036,8 +5932,8 @@
         </p:blipFill>
         <p:spPr bwMode="auto">
           <a:xfrm>
-            <a:off x="457200" y="1952408"/>
-            <a:ext cx="8229600" cy="3821547"/>
+            <a:off x="1905000" y="1371600"/>
+            <a:ext cx="5024437" cy="4830879"/>
           </a:xfrm>
           <a:prstGeom prst="rect">
             <a:avLst/>
@@ -6049,14 +5945,10 @@
             <a:headEnd/>
             <a:tailEnd/>
           </a:ln>
+          <a:effectLst/>
         </p:spPr>
       </p:pic>
     </p:spTree>
-    <p:extLst>
-      <p:ext uri="{BB962C8B-B14F-4D97-AF65-F5344CB8AC3E}">
-        <p14:creationId xmlns:p14="http://schemas.microsoft.com/office/powerpoint/2010/main" xmlns="" val="1978132826"/>
-      </p:ext>
-    </p:extLst>
   </p:cSld>
   <p:clrMapOvr>
     <a:masterClrMapping/>
@@ -6141,7 +6033,7 @@
     </p:spTree>
     <p:extLst>
       <p:ext uri="{BB962C8B-B14F-4D97-AF65-F5344CB8AC3E}">
-        <p14:creationId xmlns:p14="http://schemas.microsoft.com/office/powerpoint/2010/main" xmlns="" val="2784988280"/>
+        <p14:creationId xmlns="" xmlns:p14="http://schemas.microsoft.com/office/powerpoint/2010/main" val="2784988280"/>
       </p:ext>
     </p:extLst>
   </p:cSld>
@@ -6227,7 +6119,7 @@
     </p:spTree>
     <p:extLst>
       <p:ext uri="{BB962C8B-B14F-4D97-AF65-F5344CB8AC3E}">
-        <p14:creationId xmlns:p14="http://schemas.microsoft.com/office/powerpoint/2010/main" xmlns="" val="1843663462"/>
+        <p14:creationId xmlns="" xmlns:p14="http://schemas.microsoft.com/office/powerpoint/2010/main" val="1843663462"/>
       </p:ext>
     </p:extLst>
   </p:cSld>
@@ -6315,7 +6207,7 @@
     </p:spTree>
     <p:extLst>
       <p:ext uri="{BB962C8B-B14F-4D97-AF65-F5344CB8AC3E}">
-        <p14:creationId xmlns:p14="http://schemas.microsoft.com/office/powerpoint/2010/main" xmlns="" val="2189365695"/>
+        <p14:creationId xmlns="" xmlns:p14="http://schemas.microsoft.com/office/powerpoint/2010/main" val="2189365695"/>
       </p:ext>
     </p:extLst>
   </p:cSld>
@@ -6398,7 +6290,7 @@
     </p:spTree>
     <p:extLst>
       <p:ext uri="{BB962C8B-B14F-4D97-AF65-F5344CB8AC3E}">
-        <p14:creationId xmlns:p14="http://schemas.microsoft.com/office/powerpoint/2010/main" xmlns="" val="438603420"/>
+        <p14:creationId xmlns="" xmlns:p14="http://schemas.microsoft.com/office/powerpoint/2010/main" val="438603420"/>
       </p:ext>
     </p:extLst>
   </p:cSld>
@@ -6481,7 +6373,7 @@
     </p:spTree>
     <p:extLst>
       <p:ext uri="{BB962C8B-B14F-4D97-AF65-F5344CB8AC3E}">
-        <p14:creationId xmlns:p14="http://schemas.microsoft.com/office/powerpoint/2010/main" xmlns="" val="201867265"/>
+        <p14:creationId xmlns="" xmlns:p14="http://schemas.microsoft.com/office/powerpoint/2010/main" val="201867265"/>
       </p:ext>
     </p:extLst>
   </p:cSld>
@@ -6568,7 +6460,7 @@
     </p:spTree>
     <p:extLst>
       <p:ext uri="{BB962C8B-B14F-4D97-AF65-F5344CB8AC3E}">
-        <p14:creationId xmlns:p14="http://schemas.microsoft.com/office/powerpoint/2010/main" xmlns="" val="64994429"/>
+        <p14:creationId xmlns="" xmlns:p14="http://schemas.microsoft.com/office/powerpoint/2010/main" val="64994429"/>
       </p:ext>
     </p:extLst>
   </p:cSld>
@@ -6655,7 +6547,7 @@
     </p:spTree>
     <p:extLst>
       <p:ext uri="{BB962C8B-B14F-4D97-AF65-F5344CB8AC3E}">
-        <p14:creationId xmlns:p14="http://schemas.microsoft.com/office/powerpoint/2010/main" xmlns="" val="2006203482"/>
+        <p14:creationId xmlns="" xmlns:p14="http://schemas.microsoft.com/office/powerpoint/2010/main" val="2006203482"/>
       </p:ext>
     </p:extLst>
   </p:cSld>
@@ -6699,7 +6591,7 @@
           <a:p>
             <a:r>
               <a:rPr lang="en-US" dirty="0"/>
-              <a:t>Project Profile</a:t>
+              <a:t>Existing System</a:t>
             </a:r>
             <a:endParaRPr lang="en-IN" dirty="0"/>
           </a:p>
@@ -6717,155 +6609,21 @@
         </p:nvSpPr>
         <p:spPr/>
         <p:txBody>
-          <a:bodyPr>
-            <a:normAutofit fontScale="77500" lnSpcReduction="20000"/>
-          </a:bodyPr>
-          <a:lstStyle/>
-          <a:p>
-            <a:r>
-              <a:rPr lang="en-US" b="1" dirty="0">
-                <a:latin typeface="Times New Roman" panose="02020603050405020304" pitchFamily="18" charset="0"/>
-                <a:cs typeface="Times New Roman" panose="02020603050405020304" pitchFamily="18" charset="0"/>
-              </a:rPr>
-              <a:t>Project Name: </a:t>
-            </a:r>
-            <a:r>
-              <a:rPr lang="en-US" dirty="0">
-                <a:latin typeface="Times New Roman" panose="02020603050405020304" pitchFamily="18" charset="0"/>
-                <a:cs typeface="Times New Roman" panose="02020603050405020304" pitchFamily="18" charset="0"/>
-              </a:rPr>
-              <a:t>Campus Placement Recruitment System</a:t>
-            </a:r>
-            <a:endParaRPr lang="en-IN" dirty="0">
-              <a:latin typeface="Times New Roman" panose="02020603050405020304" pitchFamily="18" charset="0"/>
-              <a:cs typeface="Times New Roman" panose="02020603050405020304" pitchFamily="18" charset="0"/>
-            </a:endParaRPr>
-          </a:p>
-          <a:p>
-            <a:r>
-              <a:rPr lang="en-US" b="1" dirty="0">
-                <a:latin typeface="Times New Roman" panose="02020603050405020304" pitchFamily="18" charset="0"/>
-                <a:cs typeface="Times New Roman" panose="02020603050405020304" pitchFamily="18" charset="0"/>
-              </a:rPr>
-              <a:t>Type of Application:</a:t>
-            </a:r>
-            <a:r>
-              <a:rPr lang="en-US" dirty="0">
-                <a:latin typeface="Times New Roman" panose="02020603050405020304" pitchFamily="18" charset="0"/>
-                <a:cs typeface="Times New Roman" panose="02020603050405020304" pitchFamily="18" charset="0"/>
-              </a:rPr>
-              <a:t> Web Application</a:t>
-            </a:r>
-            <a:endParaRPr lang="en-IN" dirty="0">
-              <a:latin typeface="Times New Roman" panose="02020603050405020304" pitchFamily="18" charset="0"/>
-              <a:cs typeface="Times New Roman" panose="02020603050405020304" pitchFamily="18" charset="0"/>
-            </a:endParaRPr>
-          </a:p>
-          <a:p>
-            <a:r>
-              <a:rPr lang="en-US" b="1" dirty="0">
-                <a:latin typeface="Times New Roman" panose="02020603050405020304" pitchFamily="18" charset="0"/>
-                <a:cs typeface="Times New Roman" panose="02020603050405020304" pitchFamily="18" charset="0"/>
-              </a:rPr>
-              <a:t>Project Description: </a:t>
-            </a:r>
-            <a:r>
-              <a:rPr lang="en-US" dirty="0">
-                <a:latin typeface="Times New Roman" panose="02020603050405020304" pitchFamily="18" charset="0"/>
-                <a:cs typeface="Times New Roman" panose="02020603050405020304" pitchFamily="18" charset="0"/>
-              </a:rPr>
-              <a:t>This Project is aimed at developing an web application for the training and Placement Department of the College. The system is a web application that can be accessed throughout the organization with proper login provide.</a:t>
-            </a:r>
-            <a:endParaRPr lang="en-IN" dirty="0">
-              <a:latin typeface="Times New Roman" panose="02020603050405020304" pitchFamily="18" charset="0"/>
-              <a:cs typeface="Times New Roman" panose="02020603050405020304" pitchFamily="18" charset="0"/>
-            </a:endParaRPr>
-          </a:p>
-          <a:p>
-            <a:r>
-              <a:rPr lang="en-US" b="1" dirty="0">
-                <a:latin typeface="Times New Roman" panose="02020603050405020304" pitchFamily="18" charset="0"/>
-                <a:cs typeface="Times New Roman" panose="02020603050405020304" pitchFamily="18" charset="0"/>
-              </a:rPr>
-              <a:t>Team Size:3 PEOPLE</a:t>
-            </a:r>
-            <a:r>
-              <a:rPr lang="en-US" dirty="0">
-                <a:latin typeface="Times New Roman" panose="02020603050405020304" pitchFamily="18" charset="0"/>
-                <a:cs typeface="Times New Roman" panose="02020603050405020304" pitchFamily="18" charset="0"/>
-              </a:rPr>
-              <a:t>	</a:t>
-            </a:r>
-            <a:endParaRPr lang="en-IN" dirty="0">
-              <a:latin typeface="Times New Roman" panose="02020603050405020304" pitchFamily="18" charset="0"/>
-              <a:cs typeface="Times New Roman" panose="02020603050405020304" pitchFamily="18" charset="0"/>
-            </a:endParaRPr>
-          </a:p>
-          <a:p>
-            <a:r>
-              <a:rPr lang="en-US" b="1" dirty="0">
-                <a:latin typeface="Times New Roman" panose="02020603050405020304" pitchFamily="18" charset="0"/>
-                <a:cs typeface="Times New Roman" panose="02020603050405020304" pitchFamily="18" charset="0"/>
-              </a:rPr>
-              <a:t>Front End: HTML,CSS,JAVASCRIPT </a:t>
-            </a:r>
-            <a:endParaRPr lang="en-IN" dirty="0">
-              <a:latin typeface="Times New Roman" panose="02020603050405020304" pitchFamily="18" charset="0"/>
-              <a:cs typeface="Times New Roman" panose="02020603050405020304" pitchFamily="18" charset="0"/>
-            </a:endParaRPr>
-          </a:p>
-          <a:p>
-            <a:r>
-              <a:rPr lang="en-US" b="1" dirty="0">
-                <a:latin typeface="Times New Roman" panose="02020603050405020304" pitchFamily="18" charset="0"/>
-                <a:cs typeface="Times New Roman" panose="02020603050405020304" pitchFamily="18" charset="0"/>
-              </a:rPr>
-              <a:t>Back End: DJANGO</a:t>
-            </a:r>
-            <a:endParaRPr lang="en-IN" dirty="0">
-              <a:latin typeface="Times New Roman" panose="02020603050405020304" pitchFamily="18" charset="0"/>
-              <a:cs typeface="Times New Roman" panose="02020603050405020304" pitchFamily="18" charset="0"/>
-            </a:endParaRPr>
-          </a:p>
-          <a:p>
-            <a:r>
-              <a:rPr lang="en-US" b="1" dirty="0">
-                <a:latin typeface="Times New Roman" panose="02020603050405020304" pitchFamily="18" charset="0"/>
-                <a:cs typeface="Times New Roman" panose="02020603050405020304" pitchFamily="18" charset="0"/>
-              </a:rPr>
-              <a:t>Database: SQLITE 3</a:t>
-            </a:r>
-            <a:r>
-              <a:rPr lang="en-US" dirty="0">
-                <a:latin typeface="Times New Roman" panose="02020603050405020304" pitchFamily="18" charset="0"/>
-                <a:cs typeface="Times New Roman" panose="02020603050405020304" pitchFamily="18" charset="0"/>
-              </a:rPr>
-              <a:t>	</a:t>
-            </a:r>
-            <a:endParaRPr lang="en-IN" dirty="0">
-              <a:latin typeface="Times New Roman" panose="02020603050405020304" pitchFamily="18" charset="0"/>
-              <a:cs typeface="Times New Roman" panose="02020603050405020304" pitchFamily="18" charset="0"/>
-            </a:endParaRPr>
-          </a:p>
-          <a:p>
-            <a:r>
-              <a:rPr lang="en-US" b="1" dirty="0">
-                <a:latin typeface="Times New Roman" panose="02020603050405020304" pitchFamily="18" charset="0"/>
-                <a:cs typeface="Times New Roman" panose="02020603050405020304" pitchFamily="18" charset="0"/>
-              </a:rPr>
-              <a:t>Tools used: VISUAL STUDIO CODE</a:t>
-            </a:r>
-            <a:endParaRPr lang="en-IN" dirty="0">
-              <a:latin typeface="Times New Roman" panose="02020603050405020304" pitchFamily="18" charset="0"/>
-              <a:cs typeface="Times New Roman" panose="02020603050405020304" pitchFamily="18" charset="0"/>
-            </a:endParaRPr>
+          <a:bodyPr/>
+          <a:lstStyle/>
+          <a:p>
+            <a:r>
+              <a:rPr lang="en-US" dirty="0" smtClean="0"/>
+              <a:t>The existing manual placement management system is inefficient and error-prone, requiring significant time and effort to collect and maintain student data, which leads to inaccuracies, confidentiality risks, and difficulties in tracking progress, ultimately hindering effective placements for students and employers.</a:t>
+            </a:r>
+            <a:endParaRPr lang="en-IN" dirty="0"/>
           </a:p>
         </p:txBody>
       </p:sp>
     </p:spTree>
     <p:extLst>
       <p:ext uri="{BB962C8B-B14F-4D97-AF65-F5344CB8AC3E}">
-        <p14:creationId xmlns:p14="http://schemas.microsoft.com/office/powerpoint/2010/main" xmlns="" val="1468528787"/>
+        <p14:creationId xmlns="" xmlns:p14="http://schemas.microsoft.com/office/powerpoint/2010/main" val="2303572272"/>
       </p:ext>
     </p:extLst>
   </p:cSld>
@@ -6982,7 +6740,7 @@
     </p:spTree>
     <p:extLst>
       <p:ext uri="{BB962C8B-B14F-4D97-AF65-F5344CB8AC3E}">
-        <p14:creationId xmlns:p14="http://schemas.microsoft.com/office/powerpoint/2010/main" xmlns="" val="3882848927"/>
+        <p14:creationId xmlns="" xmlns:p14="http://schemas.microsoft.com/office/powerpoint/2010/main" val="3882848927"/>
       </p:ext>
     </p:extLst>
   </p:cSld>
@@ -7024,7 +6782,11 @@
           <a:bodyPr/>
           <a:lstStyle/>
           <a:p>
-            <a:endParaRPr lang="en-IN"/>
+            <a:r>
+              <a:rPr lang="en-IN" dirty="0" smtClean="0"/>
+              <a:t>Reset Password</a:t>
+            </a:r>
+            <a:endParaRPr lang="en-IN" dirty="0"/>
           </a:p>
         </p:txBody>
       </p:sp>
@@ -7065,7 +6827,7 @@
     </p:spTree>
     <p:extLst>
       <p:ext uri="{BB962C8B-B14F-4D97-AF65-F5344CB8AC3E}">
-        <p14:creationId xmlns:p14="http://schemas.microsoft.com/office/powerpoint/2010/main" xmlns="" val="2794071290"/>
+        <p14:creationId xmlns="" xmlns:p14="http://schemas.microsoft.com/office/powerpoint/2010/main" val="2794071290"/>
       </p:ext>
     </p:extLst>
   </p:cSld>
@@ -7128,7 +6890,7 @@
         <p:spPr/>
         <p:txBody>
           <a:bodyPr>
-            <a:normAutofit fontScale="70000" lnSpcReduction="20000"/>
+            <a:normAutofit fontScale="77500" lnSpcReduction="20000"/>
           </a:bodyPr>
           <a:lstStyle/>
           <a:p>
@@ -7144,17 +6906,11 @@
           <a:p>
             <a:r>
               <a:rPr lang="en-US" b="1" dirty="0" smtClean="0"/>
-              <a:t>Automated Interview Scheduling</a:t>
-            </a:r>
-            <a:r>
-              <a:rPr lang="en-US" dirty="0" smtClean="0"/>
-              <a:t>: Streamlines the interview process by automating scheduling based on availability, reducing conflicts, and sending timely notifications and reminders.</a:t>
-            </a:r>
-          </a:p>
-          <a:p>
+              <a:t>Mobile </a:t>
+            </a:r>
             <a:r>
               <a:rPr lang="en-US" b="1" dirty="0" smtClean="0"/>
-              <a:t>Mobile Application</a:t>
+              <a:t>Application</a:t>
             </a:r>
             <a:r>
               <a:rPr lang="en-US" dirty="0" smtClean="0"/>
@@ -7217,8 +6973,8 @@
           <a:lstStyle/>
           <a:p>
             <a:r>
-              <a:rPr lang="en-US" dirty="0" smtClean="0"/>
-              <a:t>Bibliography</a:t>
+              <a:rPr lang="en-US" dirty="0" err="1" smtClean="0"/>
+              <a:t>Referances</a:t>
             </a:r>
             <a:endParaRPr lang="en-US" dirty="0"/>
           </a:p>
@@ -7236,37 +6992,116 @@
         </p:nvSpPr>
         <p:spPr/>
         <p:txBody>
-          <a:bodyPr/>
-          <a:lstStyle/>
-          <a:p>
-            <a:r>
-              <a:rPr lang="en-US" dirty="0" smtClean="0"/>
-              <a:t>The </a:t>
-            </a:r>
+          <a:bodyPr>
+            <a:normAutofit fontScale="92500" lnSpcReduction="20000"/>
+          </a:bodyPr>
+          <a:lstStyle/>
+          <a:p>
             <a:r>
               <a:rPr lang="en-US" b="1" dirty="0" smtClean="0"/>
-              <a:t>Campus Placement Recruitment System</a:t>
-            </a:r>
-            <a:r>
-              <a:rPr lang="en-US" dirty="0" smtClean="0"/>
-              <a:t> project references The Definitive Guide to Django by Pollock &amp; </a:t>
-            </a:r>
-            <a:r>
-              <a:rPr lang="en-US" dirty="0" err="1" smtClean="0"/>
-              <a:t>Holovaty</a:t>
-            </a:r>
-            <a:r>
-              <a:rPr lang="en-US" dirty="0" smtClean="0"/>
-              <a:t> (2009) and academic articles like Reddy’s "A Comparative Study on Campus Placement Systems" (2019). Key resources include Django Documentation (2023), MDN Web Docs (2023), and tutorials like </a:t>
-            </a:r>
-            <a:r>
-              <a:rPr lang="en-US" dirty="0" err="1" smtClean="0"/>
-              <a:t>Traversy</a:t>
-            </a:r>
-            <a:r>
-              <a:rPr lang="en-US" dirty="0" smtClean="0"/>
-              <a:t> Media’s Django Crash Course (2022).</a:t>
-            </a:r>
+              <a:t>Python Resources:</a:t>
+            </a:r>
+          </a:p>
+          <a:p>
+            <a:r>
+              <a:rPr lang="en-US" sz="2900" dirty="0" smtClean="0">
+                <a:hlinkClick r:id="rId2"/>
+              </a:rPr>
+              <a:t>Python Documentation (Official)</a:t>
+            </a:r>
+            <a:endParaRPr lang="en-US" sz="2900" dirty="0" smtClean="0"/>
+          </a:p>
+          <a:p>
+            <a:r>
+              <a:rPr lang="en-US" sz="2900" dirty="0" smtClean="0">
+                <a:hlinkClick r:id="rId3"/>
+              </a:rPr>
+              <a:t>W3Schools Python Tutorial</a:t>
+            </a:r>
+            <a:endParaRPr lang="en-US" sz="2900" dirty="0" smtClean="0"/>
+          </a:p>
+          <a:p>
+            <a:r>
+              <a:rPr lang="en-US" b="1" dirty="0" smtClean="0"/>
+              <a:t>Django Resources:</a:t>
+            </a:r>
+          </a:p>
+          <a:p>
+            <a:r>
+              <a:rPr lang="en-US" sz="2800" dirty="0" smtClean="0">
+                <a:hlinkClick r:id="rId4"/>
+              </a:rPr>
+              <a:t>Django Documentation (Official)</a:t>
+            </a:r>
+            <a:endParaRPr lang="en-US" sz="2800" dirty="0" smtClean="0"/>
+          </a:p>
+          <a:p>
+            <a:r>
+              <a:rPr lang="en-US" sz="2800" dirty="0" smtClean="0">
+                <a:hlinkClick r:id="rId5"/>
+              </a:rPr>
+              <a:t>MDN Web Docs Django Tutorial</a:t>
+            </a:r>
+            <a:endParaRPr lang="en-US" sz="2800" dirty="0" smtClean="0"/>
+          </a:p>
+          <a:p>
+            <a:r>
+              <a:rPr lang="en-US" sz="2800" dirty="0" err="1" smtClean="0">
+                <a:hlinkClick r:id="rId6"/>
+              </a:rPr>
+              <a:t>GeeksforGeeks</a:t>
+            </a:r>
+            <a:r>
+              <a:rPr lang="en-US" sz="2800" dirty="0" smtClean="0">
+                <a:hlinkClick r:id="rId6"/>
+              </a:rPr>
+              <a:t> Django Tutorial</a:t>
+            </a:r>
+            <a:endParaRPr lang="en-US" sz="2800" dirty="0" smtClean="0"/>
+          </a:p>
+          <a:p>
+            <a:r>
+              <a:rPr lang="en-US" b="1" dirty="0" smtClean="0"/>
+              <a:t>HTML, CSS, and JavaScript Resources:</a:t>
+            </a:r>
+          </a:p>
+          <a:p>
+            <a:r>
+              <a:rPr lang="en-US" sz="2600" dirty="0" smtClean="0">
+                <a:hlinkClick r:id="rId7"/>
+              </a:rPr>
+              <a:t>W3Schools </a:t>
+            </a:r>
+            <a:r>
+              <a:rPr lang="en-US" sz="2600" dirty="0" smtClean="0">
+                <a:hlinkClick r:id="rId7"/>
+              </a:rPr>
+              <a:t>CSS Tutorial</a:t>
+            </a:r>
+            <a:endParaRPr lang="en-US" sz="2600" dirty="0" smtClean="0"/>
+          </a:p>
+          <a:p>
+            <a:r>
+              <a:rPr lang="en-US" sz="2600" dirty="0" smtClean="0">
+                <a:hlinkClick r:id="rId8"/>
+              </a:rPr>
+              <a:t>W3Schools JavaScript Tutorial</a:t>
+            </a:r>
+            <a:endParaRPr lang="en-US" sz="2600" dirty="0" smtClean="0"/>
+          </a:p>
+          <a:p>
+            <a:r>
+              <a:rPr lang="en-US" sz="2600" dirty="0" smtClean="0">
+                <a:hlinkClick r:id="rId9"/>
+              </a:rPr>
+              <a:t>W3Schools HTML Tutorial</a:t>
+            </a:r>
+            <a:endParaRPr lang="en-US" sz="2600" dirty="0" smtClean="0"/>
+          </a:p>
+          <a:p>
+            <a:pPr>
+              <a:buNone/>
+            </a:pPr>
             <a:endParaRPr lang="en-US" dirty="0"/>
           </a:p>
         </p:txBody>
@@ -7276,6 +7111,13 @@
   <p:clrMapOvr>
     <a:masterClrMapping/>
   </p:clrMapOvr>
+  <p:timing>
+    <p:tnLst>
+      <p:par>
+        <p:cTn id="1" dur="indefinite" restart="never" nodeType="tmRoot"/>
+      </p:par>
+    </p:tnLst>
+  </p:timing>
 </p:sld>
 </file>
 
@@ -7353,13 +7195,20 @@
     </p:spTree>
     <p:extLst>
       <p:ext uri="{BB962C8B-B14F-4D97-AF65-F5344CB8AC3E}">
-        <p14:creationId xmlns:p14="http://schemas.microsoft.com/office/powerpoint/2010/main" xmlns="" val="2223469557"/>
+        <p14:creationId xmlns="" xmlns:p14="http://schemas.microsoft.com/office/powerpoint/2010/main" val="2223469557"/>
       </p:ext>
     </p:extLst>
   </p:cSld>
   <p:clrMapOvr>
     <a:masterClrMapping/>
   </p:clrMapOvr>
+  <p:timing>
+    <p:tnLst>
+      <p:par>
+        <p:cTn id="1" dur="indefinite" restart="never" nodeType="tmRoot"/>
+      </p:par>
+    </p:tnLst>
+  </p:timing>
 </p:sld>
 </file>
 
@@ -7397,7 +7246,7 @@
           <a:p>
             <a:r>
               <a:rPr lang="en-US" dirty="0"/>
-              <a:t>Existing System</a:t>
+              <a:t>Proposed System</a:t>
             </a:r>
             <a:endParaRPr lang="en-IN" dirty="0"/>
           </a:p>
@@ -7415,13 +7264,69 @@
         </p:nvSpPr>
         <p:spPr/>
         <p:txBody>
-          <a:bodyPr/>
-          <a:lstStyle/>
-          <a:p>
+          <a:bodyPr>
+            <a:normAutofit fontScale="77500" lnSpcReduction="20000"/>
+          </a:bodyPr>
+          <a:lstStyle/>
+          <a:p>
+            <a:r>
+              <a:rPr lang="en-US" b="1" dirty="0" smtClean="0"/>
+              <a:t>Web-Based </a:t>
+            </a:r>
+            <a:r>
+              <a:rPr lang="en-US" b="1" dirty="0" smtClean="0"/>
+              <a:t>System</a:t>
+            </a:r>
             <a:r>
               <a:rPr lang="en-US" dirty="0" smtClean="0"/>
-              <a:t>The existing manual placement management system is inefficient and error-prone, requiring significant time and effort to collect and maintain student data, which leads to inaccuracies, confidentiality risks, and difficulties in tracking progress, ultimately hindering effective placements for students and employers.</a:t>
-            </a:r>
+              <a:t>: The proposed system is an online placement management </a:t>
+            </a:r>
+            <a:r>
+              <a:rPr lang="en-US" dirty="0" smtClean="0"/>
+              <a:t>System designed </a:t>
+            </a:r>
+            <a:r>
+              <a:rPr lang="en-US" dirty="0" smtClean="0"/>
+              <a:t>to streamline the collection and organization of student data, reducing the time and manpower required for manual processes.</a:t>
+            </a:r>
+          </a:p>
+          <a:p>
+            <a:r>
+              <a:rPr lang="en-US" b="1" dirty="0" smtClean="0"/>
+              <a:t>User-Friendly Access</a:t>
+            </a:r>
+            <a:r>
+              <a:rPr lang="en-US" dirty="0" smtClean="0"/>
+              <a:t>: The application supports multiple user roles—such as </a:t>
+            </a:r>
+            <a:r>
+              <a:rPr lang="en-US" dirty="0" smtClean="0"/>
+              <a:t>placement officers, Coordinator, </a:t>
+            </a:r>
+            <a:r>
+              <a:rPr lang="en-US" dirty="0" smtClean="0"/>
+              <a:t>and students—allowing each user to manage and upload information securely through personalized accounts.</a:t>
+            </a:r>
+          </a:p>
+          <a:p>
+            <a:r>
+              <a:rPr lang="en-US" b="1" dirty="0" smtClean="0"/>
+              <a:t>Primary Objective </a:t>
+            </a:r>
+            <a:r>
+              <a:rPr lang="en-US" dirty="0" smtClean="0"/>
+              <a:t>: </a:t>
+            </a:r>
+            <a:r>
+              <a:rPr lang="en-US" dirty="0" smtClean="0"/>
+              <a:t>The primary objective of CPRS is to provide a one-stop solution for managing the entire placement process, from registration to job offers.</a:t>
+            </a:r>
+            <a:endParaRPr lang="en-US" dirty="0" smtClean="0"/>
+          </a:p>
+          <a:p>
+            <a:pPr>
+              <a:buNone/>
+            </a:pPr>
             <a:endParaRPr lang="en-IN" dirty="0"/>
           </a:p>
         </p:txBody>
@@ -7429,7 +7334,7 @@
     </p:spTree>
     <p:extLst>
       <p:ext uri="{BB962C8B-B14F-4D97-AF65-F5344CB8AC3E}">
-        <p14:creationId xmlns:p14="http://schemas.microsoft.com/office/powerpoint/2010/main" xmlns="" val="2303572272"/>
+        <p14:creationId xmlns="" xmlns:p14="http://schemas.microsoft.com/office/powerpoint/2010/main" val="1188834910"/>
       </p:ext>
     </p:extLst>
   </p:cSld>
@@ -7472,77 +7377,73 @@
           <a:lstStyle/>
           <a:p>
             <a:r>
-              <a:rPr lang="en-US" dirty="0"/>
-              <a:t>Proposed System</a:t>
+              <a:rPr lang="en-IN" dirty="0"/>
+              <a:t>Use </a:t>
+            </a:r>
+            <a:r>
+              <a:rPr lang="en-IN" dirty="0" smtClean="0"/>
+              <a:t>Case Diagram </a:t>
+            </a:r>
+            <a:r>
+              <a:rPr lang="en-IN" dirty="0" smtClean="0"/>
+              <a:t>Coordinator</a:t>
             </a:r>
             <a:endParaRPr lang="en-IN" dirty="0"/>
           </a:p>
         </p:txBody>
       </p:sp>
-      <p:sp>
-        <p:nvSpPr>
-          <p:cNvPr id="3" name="Content Placeholder 2"/>
-          <p:cNvSpPr>
-            <a:spLocks noGrp="1"/>
-          </p:cNvSpPr>
+      <p:pic>
+        <p:nvPicPr>
+          <p:cNvPr id="5" name="Content Placeholder 4">
+            <a:extLst>
+              <a:ext uri="{FF2B5EF4-FFF2-40B4-BE49-F238E27FC236}">
+                <a16:creationId xmlns="" xmlns:a16="http://schemas.microsoft.com/office/drawing/2014/main" id="{BE97C83F-D697-9992-1CA0-1209D173EFCC}"/>
+              </a:ext>
+            </a:extLst>
+          </p:cNvPr>
+          <p:cNvPicPr>
+            <a:picLocks noGrp="1" noChangeAspect="1"/>
+          </p:cNvPicPr>
           <p:nvPr>
             <p:ph idx="1"/>
           </p:nvPr>
-        </p:nvSpPr>
-        <p:spPr/>
-        <p:txBody>
-          <a:bodyPr>
-            <a:normAutofit fontScale="70000" lnSpcReduction="20000"/>
-          </a:bodyPr>
-          <a:lstStyle/>
-          <a:p>
-            <a:r>
-              <a:rPr lang="en-US" b="1" dirty="0" smtClean="0"/>
-              <a:t>Web-Based Management System</a:t>
-            </a:r>
-            <a:r>
-              <a:rPr lang="en-US" dirty="0" smtClean="0"/>
-              <a:t>: The proposed system is an online placement management application designed to streamline the collection and organization of student data, reducing the time and manpower required for manual processes.</a:t>
-            </a:r>
-          </a:p>
-          <a:p>
-            <a:r>
-              <a:rPr lang="en-US" b="1" dirty="0" smtClean="0"/>
-              <a:t>User-Friendly Access</a:t>
-            </a:r>
-            <a:r>
-              <a:rPr lang="en-US" dirty="0" smtClean="0"/>
-              <a:t>: The application supports multiple user roles—such as principals, HODs, placement officers, and students—allowing each user to manage and upload information securely through personalized accounts.</a:t>
-            </a:r>
-          </a:p>
-          <a:p>
-            <a:r>
-              <a:rPr lang="en-US" b="1" dirty="0" smtClean="0"/>
-              <a:t>Predictive Analytics</a:t>
-            </a:r>
-            <a:r>
-              <a:rPr lang="en-US" dirty="0" smtClean="0"/>
-              <a:t>: A key feature includes a machine learning component that predicts students' placement probabilities based on their skills, academic performance, and historical placement data from their department, enhancing the placement process for both students and colleges.</a:t>
-            </a:r>
-          </a:p>
-          <a:p>
-            <a:pPr>
-              <a:buNone/>
-            </a:pPr>
-            <a:endParaRPr lang="en-IN" dirty="0"/>
-          </a:p>
-        </p:txBody>
-      </p:sp>
+        </p:nvPicPr>
+        <p:blipFill>
+          <a:blip r:embed="rId2">
+            <a:extLst>
+              <a:ext uri="{28A0092B-C50C-407E-A947-70E740481C1C}">
+                <a14:useLocalDpi xmlns="" xmlns:a14="http://schemas.microsoft.com/office/drawing/2010/main" val="0"/>
+              </a:ext>
+            </a:extLst>
+          </a:blip>
+          <a:stretch>
+            <a:fillRect/>
+          </a:stretch>
+        </p:blipFill>
+        <p:spPr>
+          <a:xfrm>
+            <a:off x="2643038" y="1600200"/>
+            <a:ext cx="3857924" cy="4525963"/>
+          </a:xfrm>
+        </p:spPr>
+      </p:pic>
     </p:spTree>
     <p:extLst>
       <p:ext uri="{BB962C8B-B14F-4D97-AF65-F5344CB8AC3E}">
-        <p14:creationId xmlns:p14="http://schemas.microsoft.com/office/powerpoint/2010/main" xmlns="" val="1188834910"/>
+        <p14:creationId xmlns="" xmlns:p14="http://schemas.microsoft.com/office/powerpoint/2010/main" val="1056953279"/>
       </p:ext>
     </p:extLst>
   </p:cSld>
   <p:clrMapOvr>
     <a:masterClrMapping/>
   </p:clrMapOvr>
+  <p:timing>
+    <p:tnLst>
+      <p:par>
+        <p:cTn id="1" dur="indefinite" restart="never" nodeType="tmRoot"/>
+      </p:par>
+    </p:tnLst>
+  </p:timing>
 </p:sld>
 </file>
 
@@ -7579,12 +7480,16 @@
           <a:lstStyle/>
           <a:p>
             <a:r>
-              <a:rPr lang="en-IN" dirty="0"/>
+              <a:rPr lang="en-IN" dirty="0" smtClean="0"/>
               <a:t>Use </a:t>
             </a:r>
             <a:r>
               <a:rPr lang="en-IN" dirty="0" smtClean="0"/>
-              <a:t>Case Coordinator</a:t>
+              <a:t>Case Diagram </a:t>
+            </a:r>
+            <a:r>
+              <a:rPr lang="en-IN" dirty="0" smtClean="0"/>
+              <a:t>Student</a:t>
             </a:r>
             <a:endParaRPr lang="en-IN" dirty="0"/>
           </a:p>
@@ -7595,7 +7500,7 @@
           <p:cNvPr id="5" name="Content Placeholder 4">
             <a:extLst>
               <a:ext uri="{FF2B5EF4-FFF2-40B4-BE49-F238E27FC236}">
-                <a16:creationId xmlns:a16="http://schemas.microsoft.com/office/drawing/2014/main" xmlns="" id="{BE97C83F-D697-9992-1CA0-1209D173EFCC}"/>
+                <a16:creationId xmlns="" xmlns:a16="http://schemas.microsoft.com/office/drawing/2014/main" id="{D4D59930-99FC-F050-4912-20DD0D7C4135}"/>
               </a:ext>
             </a:extLst>
           </p:cNvPr>
@@ -7610,7 +7515,7 @@
           <a:blip r:embed="rId2">
             <a:extLst>
               <a:ext uri="{28A0092B-C50C-407E-A947-70E740481C1C}">
-                <a14:useLocalDpi xmlns:a14="http://schemas.microsoft.com/office/drawing/2010/main" xmlns="" val="0"/>
+                <a14:useLocalDpi xmlns="" xmlns:a14="http://schemas.microsoft.com/office/drawing/2010/main" val="0"/>
               </a:ext>
             </a:extLst>
           </a:blip>
@@ -7620,21 +7525,28 @@
         </p:blipFill>
         <p:spPr>
           <a:xfrm>
-            <a:off x="2643038" y="1600200"/>
-            <a:ext cx="3857924" cy="4525963"/>
+            <a:off x="2533650" y="1653381"/>
+            <a:ext cx="4076700" cy="4419600"/>
           </a:xfrm>
         </p:spPr>
       </p:pic>
     </p:spTree>
     <p:extLst>
       <p:ext uri="{BB962C8B-B14F-4D97-AF65-F5344CB8AC3E}">
-        <p14:creationId xmlns:p14="http://schemas.microsoft.com/office/powerpoint/2010/main" xmlns="" val="1056953279"/>
+        <p14:creationId xmlns="" xmlns:p14="http://schemas.microsoft.com/office/powerpoint/2010/main" val="2821129579"/>
       </p:ext>
     </p:extLst>
   </p:cSld>
   <p:clrMapOvr>
     <a:masterClrMapping/>
   </p:clrMapOvr>
+  <p:timing>
+    <p:tnLst>
+      <p:par>
+        <p:cTn id="1" dur="indefinite" restart="never" nodeType="tmRoot"/>
+      </p:par>
+    </p:tnLst>
+  </p:timing>
 </p:sld>
 </file>
 
@@ -7672,7 +7584,15 @@
           <a:p>
             <a:r>
               <a:rPr lang="en-IN" dirty="0" smtClean="0"/>
-              <a:t>Use Case Student</a:t>
+              <a:t>Use </a:t>
+            </a:r>
+            <a:r>
+              <a:rPr lang="en-IN" dirty="0" smtClean="0"/>
+              <a:t>Case Diagram </a:t>
+            </a:r>
+            <a:r>
+              <a:rPr lang="en-IN" dirty="0" smtClean="0"/>
+              <a:t>Recruiter</a:t>
             </a:r>
             <a:endParaRPr lang="en-IN" dirty="0"/>
           </a:p>
@@ -7683,7 +7603,7 @@
           <p:cNvPr id="5" name="Content Placeholder 4">
             <a:extLst>
               <a:ext uri="{FF2B5EF4-FFF2-40B4-BE49-F238E27FC236}">
-                <a16:creationId xmlns:a16="http://schemas.microsoft.com/office/drawing/2014/main" xmlns="" id="{D4D59930-99FC-F050-4912-20DD0D7C4135}"/>
+                <a16:creationId xmlns="" xmlns:a16="http://schemas.microsoft.com/office/drawing/2014/main" id="{22B2527E-8898-BD2E-E5DF-C48EE2D43C54}"/>
               </a:ext>
             </a:extLst>
           </p:cNvPr>
@@ -7698,7 +7618,7 @@
           <a:blip r:embed="rId2">
             <a:extLst>
               <a:ext uri="{28A0092B-C50C-407E-A947-70E740481C1C}">
-                <a14:useLocalDpi xmlns:a14="http://schemas.microsoft.com/office/drawing/2010/main" xmlns="" val="0"/>
+                <a14:useLocalDpi xmlns="" xmlns:a14="http://schemas.microsoft.com/office/drawing/2010/main" val="0"/>
               </a:ext>
             </a:extLst>
           </a:blip>
@@ -7708,21 +7628,28 @@
         </p:blipFill>
         <p:spPr>
           <a:xfrm>
-            <a:off x="2533650" y="1653381"/>
-            <a:ext cx="4076700" cy="4419600"/>
+            <a:off x="3023828" y="1600200"/>
+            <a:ext cx="3096344" cy="4525963"/>
           </a:xfrm>
         </p:spPr>
       </p:pic>
     </p:spTree>
     <p:extLst>
       <p:ext uri="{BB962C8B-B14F-4D97-AF65-F5344CB8AC3E}">
-        <p14:creationId xmlns:p14="http://schemas.microsoft.com/office/powerpoint/2010/main" xmlns="" val="2821129579"/>
+        <p14:creationId xmlns="" xmlns:p14="http://schemas.microsoft.com/office/powerpoint/2010/main" val="1794647979"/>
       </p:ext>
     </p:extLst>
   </p:cSld>
   <p:clrMapOvr>
     <a:masterClrMapping/>
   </p:clrMapOvr>
+  <p:timing>
+    <p:tnLst>
+      <p:par>
+        <p:cTn id="1" dur="indefinite" restart="never" nodeType="tmRoot"/>
+      </p:par>
+    </p:tnLst>
+  </p:timing>
 </p:sld>
 </file>
 
@@ -7750,67 +7677,73 @@
             <a:spLocks noGrp="1"/>
           </p:cNvSpPr>
           <p:nvPr>
-            <p:ph type="title"/>
-          </p:nvPr>
-        </p:nvSpPr>
-        <p:spPr/>
-        <p:txBody>
-          <a:bodyPr/>
-          <a:lstStyle/>
-          <a:p>
-            <a:r>
-              <a:rPr lang="en-IN" dirty="0" smtClean="0"/>
-              <a:t>Use Case Recruiter</a:t>
-            </a:r>
-            <a:endParaRPr lang="en-IN" dirty="0"/>
-          </a:p>
-        </p:txBody>
-      </p:sp>
-      <p:pic>
-        <p:nvPicPr>
-          <p:cNvPr id="5" name="Content Placeholder 4">
-            <a:extLst>
-              <a:ext uri="{FF2B5EF4-FFF2-40B4-BE49-F238E27FC236}">
-                <a16:creationId xmlns:a16="http://schemas.microsoft.com/office/drawing/2014/main" xmlns="" id="{22B2527E-8898-BD2E-E5DF-C48EE2D43C54}"/>
-              </a:ext>
-            </a:extLst>
-          </p:cNvPr>
-          <p:cNvPicPr>
-            <a:picLocks noGrp="1" noChangeAspect="1"/>
-          </p:cNvPicPr>
-          <p:nvPr>
-            <p:ph idx="1"/>
-          </p:nvPr>
-        </p:nvPicPr>
-        <p:blipFill>
-          <a:blip r:embed="rId2">
-            <a:extLst>
-              <a:ext uri="{28A0092B-C50C-407E-A947-70E740481C1C}">
-                <a14:useLocalDpi xmlns:a14="http://schemas.microsoft.com/office/drawing/2010/main" xmlns="" val="0"/>
-              </a:ext>
-            </a:extLst>
-          </a:blip>
-          <a:stretch>
-            <a:fillRect/>
-          </a:stretch>
-        </p:blipFill>
+            <p:ph type="ctrTitle"/>
+          </p:nvPr>
+        </p:nvSpPr>
         <p:spPr>
           <a:xfrm>
-            <a:off x="3023828" y="1600200"/>
-            <a:ext cx="3096344" cy="4525963"/>
+            <a:off x="685800" y="1600200"/>
+            <a:ext cx="7772400" cy="1470025"/>
           </a:xfrm>
         </p:spPr>
-      </p:pic>
+        <p:txBody>
+          <a:bodyPr/>
+          <a:lstStyle/>
+          <a:p>
+            <a:r>
+              <a:rPr lang="en-IN" b="1" u="sng" dirty="0"/>
+              <a:t>Activity </a:t>
+            </a:r>
+            <a:r>
+              <a:rPr lang="en-IN" b="1" u="sng" dirty="0" smtClean="0"/>
+              <a:t>Diagram Coordinator</a:t>
+            </a:r>
+            <a:endParaRPr lang="en-IN" b="1" u="sng" dirty="0"/>
+          </a:p>
+        </p:txBody>
+      </p:sp>
+      <p:sp>
+        <p:nvSpPr>
+          <p:cNvPr id="6" name="Subtitle 5"/>
+          <p:cNvSpPr>
+            <a:spLocks noGrp="1"/>
+          </p:cNvSpPr>
+          <p:nvPr>
+            <p:ph type="subTitle" idx="1"/>
+          </p:nvPr>
+        </p:nvSpPr>
+        <p:spPr/>
+        <p:txBody>
+          <a:bodyPr/>
+          <a:lstStyle/>
+          <a:p>
+            <a:r>
+              <a:rPr lang="en-US" dirty="0" smtClean="0">
+                <a:hlinkClick r:id="rId2" action="ppaction://hlinkfile"/>
+              </a:rPr>
+              <a:t>View Diagram</a:t>
+            </a:r>
+            <a:endParaRPr lang="en-US" dirty="0"/>
+          </a:p>
+        </p:txBody>
+      </p:sp>
     </p:spTree>
     <p:extLst>
       <p:ext uri="{BB962C8B-B14F-4D97-AF65-F5344CB8AC3E}">
-        <p14:creationId xmlns:p14="http://schemas.microsoft.com/office/powerpoint/2010/main" xmlns="" val="1794647979"/>
+        <p14:creationId xmlns="" xmlns:p14="http://schemas.microsoft.com/office/powerpoint/2010/main" val="326000094"/>
       </p:ext>
     </p:extLst>
   </p:cSld>
   <p:clrMapOvr>
     <a:masterClrMapping/>
   </p:clrMapOvr>
+  <p:timing>
+    <p:tnLst>
+      <p:par>
+        <p:cTn id="1" dur="indefinite" restart="never" nodeType="tmRoot"/>
+      </p:par>
+    </p:tnLst>
+  </p:timing>
 </p:sld>
 </file>
 

</xml_diff>